<commit_message>
Conference Talk and Slides
</commit_message>
<xml_diff>
--- a/Presentation/Slides/Draft_0.pptx
+++ b/Presentation/Slides/Draft_0.pptx
@@ -6,11 +6,27 @@
   </p:sldMasterIdLst>
   <p:sldIdLst>
     <p:sldId id="256" r:id="rId2"/>
-    <p:sldId id="260" r:id="rId3"/>
-    <p:sldId id="258" r:id="rId4"/>
+    <p:sldId id="258" r:id="rId3"/>
+    <p:sldId id="261" r:id="rId4"/>
     <p:sldId id="263" r:id="rId5"/>
-    <p:sldId id="261" r:id="rId6"/>
-    <p:sldId id="262" r:id="rId7"/>
+    <p:sldId id="262" r:id="rId6"/>
+    <p:sldId id="265" r:id="rId7"/>
+    <p:sldId id="266" r:id="rId8"/>
+    <p:sldId id="267" r:id="rId9"/>
+    <p:sldId id="269" r:id="rId10"/>
+    <p:sldId id="270" r:id="rId11"/>
+    <p:sldId id="268" r:id="rId12"/>
+    <p:sldId id="271" r:id="rId13"/>
+    <p:sldId id="272" r:id="rId14"/>
+    <p:sldId id="273" r:id="rId15"/>
+    <p:sldId id="274" r:id="rId16"/>
+    <p:sldId id="280" r:id="rId17"/>
+    <p:sldId id="275" r:id="rId18"/>
+    <p:sldId id="276" r:id="rId19"/>
+    <p:sldId id="278" r:id="rId20"/>
+    <p:sldId id="277" r:id="rId21"/>
+    <p:sldId id="279" r:id="rId22"/>
+    <p:sldId id="281" r:id="rId23"/>
   </p:sldIdLst>
   <p:sldSz cx="12192000" cy="6858000"/>
   <p:notesSz cx="6858000" cy="9144000"/>
@@ -109,6 +125,11 @@
       </a:defRPr>
     </a:lvl9pPr>
   </p:defaultTextStyle>
+  <p:extLst>
+    <p:ext uri="{EFAFB233-063F-42B5-8137-9DF3F51BA10A}">
+      <p15:sldGuideLst xmlns:p15="http://schemas.microsoft.com/office/powerpoint/2012/main"/>
+    </p:ext>
+  </p:extLst>
 </p:presentation>
 </file>
 
@@ -243,7 +264,7 @@
           <a:p>
             <a:fld id="{F949668B-6509-495A-A853-42058CF472D3}" type="datetimeFigureOut">
               <a:rPr lang="en-GB" smtClean="0"/>
-              <a:t>16/06/2017</a:t>
+              <a:t>01/07/2017</a:t>
             </a:fld>
             <a:endParaRPr lang="en-GB"/>
           </a:p>
@@ -413,7 +434,7 @@
           <a:p>
             <a:fld id="{F949668B-6509-495A-A853-42058CF472D3}" type="datetimeFigureOut">
               <a:rPr lang="en-GB" smtClean="0"/>
-              <a:t>16/06/2017</a:t>
+              <a:t>01/07/2017</a:t>
             </a:fld>
             <a:endParaRPr lang="en-GB"/>
           </a:p>
@@ -593,7 +614,7 @@
           <a:p>
             <a:fld id="{F949668B-6509-495A-A853-42058CF472D3}" type="datetimeFigureOut">
               <a:rPr lang="en-GB" smtClean="0"/>
-              <a:t>16/06/2017</a:t>
+              <a:t>01/07/2017</a:t>
             </a:fld>
             <a:endParaRPr lang="en-GB"/>
           </a:p>
@@ -763,7 +784,7 @@
           <a:p>
             <a:fld id="{F949668B-6509-495A-A853-42058CF472D3}" type="datetimeFigureOut">
               <a:rPr lang="en-GB" smtClean="0"/>
-              <a:t>16/06/2017</a:t>
+              <a:t>01/07/2017</a:t>
             </a:fld>
             <a:endParaRPr lang="en-GB"/>
           </a:p>
@@ -1009,7 +1030,7 @@
           <a:p>
             <a:fld id="{F949668B-6509-495A-A853-42058CF472D3}" type="datetimeFigureOut">
               <a:rPr lang="en-GB" smtClean="0"/>
-              <a:t>16/06/2017</a:t>
+              <a:t>01/07/2017</a:t>
             </a:fld>
             <a:endParaRPr lang="en-GB"/>
           </a:p>
@@ -1241,7 +1262,7 @@
           <a:p>
             <a:fld id="{F949668B-6509-495A-A853-42058CF472D3}" type="datetimeFigureOut">
               <a:rPr lang="en-GB" smtClean="0"/>
-              <a:t>16/06/2017</a:t>
+              <a:t>01/07/2017</a:t>
             </a:fld>
             <a:endParaRPr lang="en-GB"/>
           </a:p>
@@ -1608,7 +1629,7 @@
           <a:p>
             <a:fld id="{F949668B-6509-495A-A853-42058CF472D3}" type="datetimeFigureOut">
               <a:rPr lang="en-GB" smtClean="0"/>
-              <a:t>16/06/2017</a:t>
+              <a:t>01/07/2017</a:t>
             </a:fld>
             <a:endParaRPr lang="en-GB"/>
           </a:p>
@@ -1726,7 +1747,7 @@
           <a:p>
             <a:fld id="{F949668B-6509-495A-A853-42058CF472D3}" type="datetimeFigureOut">
               <a:rPr lang="en-GB" smtClean="0"/>
-              <a:t>16/06/2017</a:t>
+              <a:t>01/07/2017</a:t>
             </a:fld>
             <a:endParaRPr lang="en-GB"/>
           </a:p>
@@ -1821,7 +1842,7 @@
           <a:p>
             <a:fld id="{F949668B-6509-495A-A853-42058CF472D3}" type="datetimeFigureOut">
               <a:rPr lang="en-GB" smtClean="0"/>
-              <a:t>16/06/2017</a:t>
+              <a:t>01/07/2017</a:t>
             </a:fld>
             <a:endParaRPr lang="en-GB"/>
           </a:p>
@@ -2098,7 +2119,7 @@
           <a:p>
             <a:fld id="{F949668B-6509-495A-A853-42058CF472D3}" type="datetimeFigureOut">
               <a:rPr lang="en-GB" smtClean="0"/>
-              <a:t>16/06/2017</a:t>
+              <a:t>01/07/2017</a:t>
             </a:fld>
             <a:endParaRPr lang="en-GB"/>
           </a:p>
@@ -2351,7 +2372,7 @@
           <a:p>
             <a:fld id="{F949668B-6509-495A-A853-42058CF472D3}" type="datetimeFigureOut">
               <a:rPr lang="en-GB" smtClean="0"/>
-              <a:t>16/06/2017</a:t>
+              <a:t>01/07/2017</a:t>
             </a:fld>
             <a:endParaRPr lang="en-GB"/>
           </a:p>
@@ -2564,7 +2585,7 @@
           <a:p>
             <a:fld id="{F949668B-6509-495A-A853-42058CF472D3}" type="datetimeFigureOut">
               <a:rPr lang="en-GB" smtClean="0"/>
-              <a:t>16/06/2017</a:t>
+              <a:t>01/07/2017</a:t>
             </a:fld>
             <a:endParaRPr lang="en-GB"/>
           </a:p>
@@ -2997,7 +3018,23 @@
                   <a:schemeClr val="accent1"/>
                 </a:solidFill>
               </a:rPr>
-              <a:t>Phylogenetic Gaussian processes for Ancestral Reconstruction of Bat Echolocation Calls</a:t>
+              <a:t>Phylogenetic Gaussian processes for </a:t>
+            </a:r>
+            <a:r>
+              <a:rPr lang="en-GB" sz="4000" dirty="0" smtClean="0">
+                <a:solidFill>
+                  <a:schemeClr val="accent1"/>
+                </a:solidFill>
+              </a:rPr>
+              <a:t>the Ancestral </a:t>
+            </a:r>
+            <a:r>
+              <a:rPr lang="en-GB" sz="4000" dirty="0" smtClean="0">
+                <a:solidFill>
+                  <a:schemeClr val="accent1"/>
+                </a:solidFill>
+              </a:rPr>
+              <a:t>Reconstruction of Bat Echolocation Calls</a:t>
             </a:r>
             <a:endParaRPr lang="en-GB" sz="4000" dirty="0">
               <a:solidFill>
@@ -3099,6 +3136,1938 @@
     <p:extLst>
       <p:ext uri="{BB962C8B-B14F-4D97-AF65-F5344CB8AC3E}">
         <p14:creationId xmlns:p14="http://schemas.microsoft.com/office/powerpoint/2010/main" val="4128283888"/>
+      </p:ext>
+    </p:extLst>
+  </p:cSld>
+  <p:clrMapOvr>
+    <a:masterClrMapping/>
+  </p:clrMapOvr>
+  <p:timing>
+    <p:tnLst>
+      <p:par>
+        <p:cTn id="1" dur="indefinite" restart="never" nodeType="tmRoot"/>
+      </p:par>
+    </p:tnLst>
+  </p:timing>
+</p:sld>
+</file>
+
+<file path=ppt/slides/slide10.xml><?xml version="1.0" encoding="utf-8"?>
+<p:sld xmlns:a="http://schemas.openxmlformats.org/drawingml/2006/main" xmlns:r="http://schemas.openxmlformats.org/officeDocument/2006/relationships" xmlns:p="http://schemas.openxmlformats.org/presentationml/2006/main">
+  <p:cSld>
+    <p:spTree>
+      <p:nvGrpSpPr>
+        <p:cNvPr id="1" name=""/>
+        <p:cNvGrpSpPr/>
+        <p:nvPr/>
+      </p:nvGrpSpPr>
+      <p:grpSpPr>
+        <a:xfrm>
+          <a:off x="0" y="0"/>
+          <a:ext cx="0" cy="0"/>
+          <a:chOff x="0" y="0"/>
+          <a:chExt cx="0" cy="0"/>
+        </a:xfrm>
+      </p:grpSpPr>
+      <p:sp>
+        <p:nvSpPr>
+          <p:cNvPr id="2" name="Title 1"/>
+          <p:cNvSpPr>
+            <a:spLocks noGrp="1"/>
+          </p:cNvSpPr>
+          <p:nvPr>
+            <p:ph type="title"/>
+          </p:nvPr>
+        </p:nvSpPr>
+        <p:spPr>
+          <a:xfrm>
+            <a:off x="838200" y="365125"/>
+            <a:ext cx="10515600" cy="768349"/>
+          </a:xfrm>
+        </p:spPr>
+        <p:txBody>
+          <a:bodyPr>
+            <a:normAutofit/>
+          </a:bodyPr>
+          <a:lstStyle/>
+          <a:p>
+            <a:r>
+              <a:rPr lang="en-GB" sz="4000" dirty="0" smtClean="0">
+                <a:solidFill>
+                  <a:schemeClr val="accent1"/>
+                </a:solidFill>
+              </a:rPr>
+              <a:t>Gaussian Processes </a:t>
+            </a:r>
+            <a:endParaRPr lang="en-GB" sz="4000" dirty="0">
+              <a:solidFill>
+                <a:schemeClr val="accent1"/>
+              </a:solidFill>
+            </a:endParaRPr>
+          </a:p>
+        </p:txBody>
+      </p:sp>
+      <p:sp>
+        <p:nvSpPr>
+          <p:cNvPr id="18" name="AutoShape 2" descr="Image result for epsrc"/>
+          <p:cNvSpPr>
+            <a:spLocks noChangeAspect="1" noChangeArrowheads="1"/>
+          </p:cNvSpPr>
+          <p:nvPr/>
+        </p:nvSpPr>
+        <p:spPr bwMode="auto">
+          <a:xfrm>
+            <a:off x="155575" y="-144463"/>
+            <a:ext cx="304800" cy="304801"/>
+          </a:xfrm>
+          <a:prstGeom prst="rect">
+            <a:avLst/>
+          </a:prstGeom>
+          <a:noFill/>
+          <a:extLst>
+            <a:ext uri="{909E8E84-426E-40DD-AFC4-6F175D3DCCD1}">
+              <a14:hiddenFill xmlns:a14="http://schemas.microsoft.com/office/drawing/2010/main">
+                <a:solidFill>
+                  <a:srgbClr val="FFFFFF"/>
+                </a:solidFill>
+              </a14:hiddenFill>
+            </a:ext>
+          </a:extLst>
+        </p:spPr>
+        <p:txBody>
+          <a:bodyPr vert="horz" wrap="square" lIns="91440" tIns="45720" rIns="91440" bIns="45720" numCol="1" anchor="t" anchorCtr="0" compatLnSpc="1">
+            <a:prstTxWarp prst="textNoShape">
+              <a:avLst/>
+            </a:prstTxWarp>
+          </a:bodyPr>
+          <a:lstStyle/>
+          <a:p>
+            <a:endParaRPr lang="en-GB"/>
+          </a:p>
+        </p:txBody>
+      </p:sp>
+      <p:sp>
+        <p:nvSpPr>
+          <p:cNvPr id="3" name="TextBox 2"/>
+          <p:cNvSpPr txBox="1"/>
+          <p:nvPr/>
+        </p:nvSpPr>
+        <p:spPr>
+          <a:xfrm>
+            <a:off x="460375" y="1684294"/>
+            <a:ext cx="10893425" cy="1077218"/>
+          </a:xfrm>
+          <a:prstGeom prst="rect">
+            <a:avLst/>
+          </a:prstGeom>
+          <a:noFill/>
+        </p:spPr>
+        <p:txBody>
+          <a:bodyPr wrap="square" rtlCol="0">
+            <a:spAutoFit/>
+          </a:bodyPr>
+          <a:lstStyle/>
+          <a:p>
+            <a:r>
+              <a:rPr lang="en-GB" sz="3200" dirty="0" smtClean="0">
+                <a:latin typeface="Times New Roman" panose="02020603050405020304" pitchFamily="18" charset="0"/>
+                <a:cs typeface="Times New Roman" panose="02020603050405020304" pitchFamily="18" charset="0"/>
+              </a:rPr>
+              <a:t>A collection of random variables, any finite number of which have a joint Gaussian distribution.</a:t>
+            </a:r>
+            <a:endParaRPr lang="en-GB" sz="3200" dirty="0">
+              <a:latin typeface="Times New Roman" panose="02020603050405020304" pitchFamily="18" charset="0"/>
+              <a:cs typeface="Times New Roman" panose="02020603050405020304" pitchFamily="18" charset="0"/>
+            </a:endParaRPr>
+          </a:p>
+        </p:txBody>
+      </p:sp>
+      <p:pic>
+        <p:nvPicPr>
+          <p:cNvPr id="8" name="Picture 7"/>
+          <p:cNvPicPr>
+            <a:picLocks noChangeAspect="1"/>
+          </p:cNvPicPr>
+          <p:nvPr>
+            <p:custDataLst>
+              <p:tags r:id="rId1"/>
+            </p:custDataLst>
+          </p:nvPr>
+        </p:nvPicPr>
+        <p:blipFill>
+          <a:blip r:embed="rId3" cstate="print">
+            <a:extLst>
+              <a:ext uri="{28A0092B-C50C-407E-A947-70E740481C1C}">
+                <a14:useLocalDpi xmlns:a14="http://schemas.microsoft.com/office/drawing/2010/main" val="0"/>
+              </a:ext>
+            </a:extLst>
+          </a:blip>
+          <a:stretch>
+            <a:fillRect/>
+          </a:stretch>
+        </p:blipFill>
+        <p:spPr>
+          <a:xfrm>
+            <a:off x="4179679" y="3312333"/>
+            <a:ext cx="3454816" cy="2996615"/>
+          </a:xfrm>
+          <a:prstGeom prst="rect">
+            <a:avLst/>
+          </a:prstGeom>
+        </p:spPr>
+      </p:pic>
+    </p:spTree>
+    <p:extLst>
+      <p:ext uri="{BB962C8B-B14F-4D97-AF65-F5344CB8AC3E}">
+        <p14:creationId xmlns:p14="http://schemas.microsoft.com/office/powerpoint/2010/main" val="2675952883"/>
+      </p:ext>
+    </p:extLst>
+  </p:cSld>
+  <p:clrMapOvr>
+    <a:masterClrMapping/>
+  </p:clrMapOvr>
+  <p:timing>
+    <p:tnLst>
+      <p:par>
+        <p:cTn id="1" dur="indefinite" restart="never" nodeType="tmRoot"/>
+      </p:par>
+    </p:tnLst>
+  </p:timing>
+</p:sld>
+</file>
+
+<file path=ppt/slides/slide11.xml><?xml version="1.0" encoding="utf-8"?>
+<p:sld xmlns:a="http://schemas.openxmlformats.org/drawingml/2006/main" xmlns:r="http://schemas.openxmlformats.org/officeDocument/2006/relationships" xmlns:p="http://schemas.openxmlformats.org/presentationml/2006/main">
+  <p:cSld>
+    <p:spTree>
+      <p:nvGrpSpPr>
+        <p:cNvPr id="1" name=""/>
+        <p:cNvGrpSpPr/>
+        <p:nvPr/>
+      </p:nvGrpSpPr>
+      <p:grpSpPr>
+        <a:xfrm>
+          <a:off x="0" y="0"/>
+          <a:ext cx="0" cy="0"/>
+          <a:chOff x="0" y="0"/>
+          <a:chExt cx="0" cy="0"/>
+        </a:xfrm>
+      </p:grpSpPr>
+      <p:sp>
+        <p:nvSpPr>
+          <p:cNvPr id="2" name="Title 1"/>
+          <p:cNvSpPr>
+            <a:spLocks noGrp="1"/>
+          </p:cNvSpPr>
+          <p:nvPr>
+            <p:ph type="title"/>
+          </p:nvPr>
+        </p:nvSpPr>
+        <p:spPr>
+          <a:xfrm>
+            <a:off x="838200" y="365125"/>
+            <a:ext cx="10515600" cy="768349"/>
+          </a:xfrm>
+        </p:spPr>
+        <p:txBody>
+          <a:bodyPr>
+            <a:normAutofit/>
+          </a:bodyPr>
+          <a:lstStyle/>
+          <a:p>
+            <a:r>
+              <a:rPr lang="en-GB" sz="4000" dirty="0" smtClean="0">
+                <a:solidFill>
+                  <a:schemeClr val="accent1"/>
+                </a:solidFill>
+              </a:rPr>
+              <a:t>Phylogenetic Gaussian Processes: Assumptions</a:t>
+            </a:r>
+            <a:endParaRPr lang="en-GB" sz="4000" dirty="0">
+              <a:solidFill>
+                <a:schemeClr val="accent1"/>
+              </a:solidFill>
+            </a:endParaRPr>
+          </a:p>
+        </p:txBody>
+      </p:sp>
+      <p:sp>
+        <p:nvSpPr>
+          <p:cNvPr id="18" name="AutoShape 2" descr="Image result for epsrc"/>
+          <p:cNvSpPr>
+            <a:spLocks noChangeAspect="1" noChangeArrowheads="1"/>
+          </p:cNvSpPr>
+          <p:nvPr/>
+        </p:nvSpPr>
+        <p:spPr bwMode="auto">
+          <a:xfrm>
+            <a:off x="155575" y="-144463"/>
+            <a:ext cx="304800" cy="304801"/>
+          </a:xfrm>
+          <a:prstGeom prst="rect">
+            <a:avLst/>
+          </a:prstGeom>
+          <a:noFill/>
+          <a:extLst>
+            <a:ext uri="{909E8E84-426E-40DD-AFC4-6F175D3DCCD1}">
+              <a14:hiddenFill xmlns:a14="http://schemas.microsoft.com/office/drawing/2010/main">
+                <a:solidFill>
+                  <a:srgbClr val="FFFFFF"/>
+                </a:solidFill>
+              </a14:hiddenFill>
+            </a:ext>
+          </a:extLst>
+        </p:spPr>
+        <p:txBody>
+          <a:bodyPr vert="horz" wrap="square" lIns="91440" tIns="45720" rIns="91440" bIns="45720" numCol="1" anchor="t" anchorCtr="0" compatLnSpc="1">
+            <a:prstTxWarp prst="textNoShape">
+              <a:avLst/>
+            </a:prstTxWarp>
+          </a:bodyPr>
+          <a:lstStyle/>
+          <a:p>
+            <a:endParaRPr lang="en-GB"/>
+          </a:p>
+        </p:txBody>
+      </p:sp>
+      <p:sp>
+        <p:nvSpPr>
+          <p:cNvPr id="5" name="TextBox 4"/>
+          <p:cNvSpPr txBox="1"/>
+          <p:nvPr/>
+        </p:nvSpPr>
+        <p:spPr>
+          <a:xfrm>
+            <a:off x="838200" y="1453661"/>
+            <a:ext cx="10515600" cy="3046988"/>
+          </a:xfrm>
+          <a:prstGeom prst="rect">
+            <a:avLst/>
+          </a:prstGeom>
+          <a:noFill/>
+        </p:spPr>
+        <p:txBody>
+          <a:bodyPr wrap="square" rtlCol="0">
+            <a:spAutoFit/>
+          </a:bodyPr>
+          <a:lstStyle/>
+          <a:p>
+            <a:pPr marL="342900" indent="-342900">
+              <a:buFont typeface="+mj-lt"/>
+              <a:buAutoNum type="arabicPeriod"/>
+            </a:pPr>
+            <a:r>
+              <a:rPr lang="en-GB" sz="3200" i="1" dirty="0">
+                <a:latin typeface="Times New Roman" panose="02020603050405020304" pitchFamily="18" charset="0"/>
+                <a:cs typeface="Times New Roman" panose="02020603050405020304" pitchFamily="18" charset="0"/>
+              </a:rPr>
+              <a:t>Conditional on their common ancestors in the </a:t>
+            </a:r>
+            <a:r>
+              <a:rPr lang="en-GB" sz="3200" i="1" dirty="0" smtClean="0">
+                <a:latin typeface="Times New Roman" panose="02020603050405020304" pitchFamily="18" charset="0"/>
+                <a:cs typeface="Times New Roman" panose="02020603050405020304" pitchFamily="18" charset="0"/>
+              </a:rPr>
+              <a:t>phylogenetic tree </a:t>
+            </a:r>
+            <a:r>
+              <a:rPr lang="en-GB" sz="3200" b="1" i="1" dirty="0">
+                <a:latin typeface="Times New Roman" panose="02020603050405020304" pitchFamily="18" charset="0"/>
+                <a:cs typeface="Times New Roman" panose="02020603050405020304" pitchFamily="18" charset="0"/>
+              </a:rPr>
+              <a:t>T </a:t>
+            </a:r>
+            <a:r>
+              <a:rPr lang="en-GB" sz="3200" i="1" dirty="0">
+                <a:latin typeface="Times New Roman" panose="02020603050405020304" pitchFamily="18" charset="0"/>
+                <a:cs typeface="Times New Roman" panose="02020603050405020304" pitchFamily="18" charset="0"/>
+              </a:rPr>
+              <a:t>any two traits are statistically </a:t>
+            </a:r>
+            <a:r>
+              <a:rPr lang="en-GB" sz="3200" i="1" dirty="0" smtClean="0">
+                <a:latin typeface="Times New Roman" panose="02020603050405020304" pitchFamily="18" charset="0"/>
+                <a:cs typeface="Times New Roman" panose="02020603050405020304" pitchFamily="18" charset="0"/>
+              </a:rPr>
+              <a:t>independent.</a:t>
+            </a:r>
+          </a:p>
+          <a:p>
+            <a:pPr marL="342900" indent="-342900">
+              <a:buFont typeface="+mj-lt"/>
+              <a:buAutoNum type="arabicPeriod"/>
+            </a:pPr>
+            <a:r>
+              <a:rPr lang="en-GB" sz="3200" i="1" dirty="0" smtClean="0">
+                <a:latin typeface="Times New Roman" panose="02020603050405020304" pitchFamily="18" charset="0"/>
+                <a:cs typeface="Times New Roman" panose="02020603050405020304" pitchFamily="18" charset="0"/>
+              </a:rPr>
+              <a:t>The </a:t>
+            </a:r>
+            <a:r>
+              <a:rPr lang="en-GB" sz="3200" i="1" dirty="0">
+                <a:latin typeface="Times New Roman" panose="02020603050405020304" pitchFamily="18" charset="0"/>
+                <a:cs typeface="Times New Roman" panose="02020603050405020304" pitchFamily="18" charset="0"/>
+              </a:rPr>
+              <a:t>statistical relationship between a trait and any of </a:t>
+            </a:r>
+            <a:r>
+              <a:rPr lang="en-GB" sz="3200" i="1" dirty="0" smtClean="0">
+                <a:latin typeface="Times New Roman" panose="02020603050405020304" pitchFamily="18" charset="0"/>
+                <a:cs typeface="Times New Roman" panose="02020603050405020304" pitchFamily="18" charset="0"/>
+              </a:rPr>
+              <a:t>its descendants </a:t>
+            </a:r>
+            <a:r>
+              <a:rPr lang="en-GB" sz="3200" i="1" dirty="0">
+                <a:latin typeface="Times New Roman" panose="02020603050405020304" pitchFamily="18" charset="0"/>
+                <a:cs typeface="Times New Roman" panose="02020603050405020304" pitchFamily="18" charset="0"/>
+              </a:rPr>
+              <a:t>in T is independent of the topology of </a:t>
+            </a:r>
+            <a:r>
+              <a:rPr lang="en-GB" sz="3200" b="1" i="1" dirty="0" smtClean="0">
+                <a:latin typeface="Times New Roman" panose="02020603050405020304" pitchFamily="18" charset="0"/>
+                <a:cs typeface="Times New Roman" panose="02020603050405020304" pitchFamily="18" charset="0"/>
+              </a:rPr>
+              <a:t>T</a:t>
+            </a:r>
+          </a:p>
+          <a:p>
+            <a:pPr marL="342900" indent="-342900">
+              <a:buFont typeface="+mj-lt"/>
+              <a:buAutoNum type="arabicPeriod"/>
+            </a:pPr>
+            <a:r>
+              <a:rPr lang="en-GB" sz="3200" i="1" dirty="0" smtClean="0">
+                <a:latin typeface="Times New Roman" panose="02020603050405020304" pitchFamily="18" charset="0"/>
+                <a:cs typeface="Times New Roman" panose="02020603050405020304" pitchFamily="18" charset="0"/>
+              </a:rPr>
+              <a:t>The </a:t>
+            </a:r>
+            <a:r>
+              <a:rPr lang="en-GB" sz="3200" i="1" dirty="0">
+                <a:latin typeface="Times New Roman" panose="02020603050405020304" pitchFamily="18" charset="0"/>
+                <a:cs typeface="Times New Roman" panose="02020603050405020304" pitchFamily="18" charset="0"/>
+              </a:rPr>
+              <a:t>marginal GP along each branch of the phylogeny </a:t>
+            </a:r>
+            <a:r>
+              <a:rPr lang="en-GB" sz="3200" i="1" dirty="0" smtClean="0">
+                <a:latin typeface="Times New Roman" panose="02020603050405020304" pitchFamily="18" charset="0"/>
+                <a:cs typeface="Times New Roman" panose="02020603050405020304" pitchFamily="18" charset="0"/>
+              </a:rPr>
+              <a:t>is space-time </a:t>
+            </a:r>
+            <a:r>
+              <a:rPr lang="en-GB" sz="3200" i="1" dirty="0">
+                <a:latin typeface="Times New Roman" panose="02020603050405020304" pitchFamily="18" charset="0"/>
+                <a:cs typeface="Times New Roman" panose="02020603050405020304" pitchFamily="18" charset="0"/>
+              </a:rPr>
+              <a:t>separable.</a:t>
+            </a:r>
+            <a:endParaRPr lang="en-GB" sz="3200" b="1" i="1" dirty="0" smtClean="0">
+              <a:latin typeface="Times New Roman" panose="02020603050405020304" pitchFamily="18" charset="0"/>
+              <a:cs typeface="Times New Roman" panose="02020603050405020304" pitchFamily="18" charset="0"/>
+            </a:endParaRPr>
+          </a:p>
+        </p:txBody>
+      </p:sp>
+      <p:pic>
+        <p:nvPicPr>
+          <p:cNvPr id="6" name="Picture 5"/>
+          <p:cNvPicPr>
+            <a:picLocks noChangeAspect="1"/>
+          </p:cNvPicPr>
+          <p:nvPr>
+            <p:custDataLst>
+              <p:tags r:id="rId1"/>
+            </p:custDataLst>
+          </p:nvPr>
+        </p:nvPicPr>
+        <p:blipFill>
+          <a:blip r:embed="rId3" cstate="print">
+            <a:extLst>
+              <a:ext uri="{28A0092B-C50C-407E-A947-70E740481C1C}">
+                <a14:useLocalDpi xmlns:a14="http://schemas.microsoft.com/office/drawing/2010/main" val="0"/>
+              </a:ext>
+            </a:extLst>
+          </a:blip>
+          <a:stretch>
+            <a:fillRect/>
+          </a:stretch>
+        </p:blipFill>
+        <p:spPr>
+          <a:xfrm>
+            <a:off x="1731444" y="4820836"/>
+            <a:ext cx="8729112" cy="642118"/>
+          </a:xfrm>
+          <a:prstGeom prst="rect">
+            <a:avLst/>
+          </a:prstGeom>
+        </p:spPr>
+      </p:pic>
+    </p:spTree>
+    <p:extLst>
+      <p:ext uri="{BB962C8B-B14F-4D97-AF65-F5344CB8AC3E}">
+        <p14:creationId xmlns:p14="http://schemas.microsoft.com/office/powerpoint/2010/main" val="228253900"/>
+      </p:ext>
+    </p:extLst>
+  </p:cSld>
+  <p:clrMapOvr>
+    <a:masterClrMapping/>
+  </p:clrMapOvr>
+  <p:timing>
+    <p:tnLst>
+      <p:par>
+        <p:cTn id="1" dur="indefinite" restart="never" nodeType="tmRoot"/>
+      </p:par>
+    </p:tnLst>
+  </p:timing>
+</p:sld>
+</file>
+
+<file path=ppt/slides/slide12.xml><?xml version="1.0" encoding="utf-8"?>
+<p:sld xmlns:a="http://schemas.openxmlformats.org/drawingml/2006/main" xmlns:r="http://schemas.openxmlformats.org/officeDocument/2006/relationships" xmlns:p="http://schemas.openxmlformats.org/presentationml/2006/main">
+  <p:cSld>
+    <p:spTree>
+      <p:nvGrpSpPr>
+        <p:cNvPr id="1" name=""/>
+        <p:cNvGrpSpPr/>
+        <p:nvPr/>
+      </p:nvGrpSpPr>
+      <p:grpSpPr>
+        <a:xfrm>
+          <a:off x="0" y="0"/>
+          <a:ext cx="0" cy="0"/>
+          <a:chOff x="0" y="0"/>
+          <a:chExt cx="0" cy="0"/>
+        </a:xfrm>
+      </p:grpSpPr>
+      <p:sp>
+        <p:nvSpPr>
+          <p:cNvPr id="2" name="Title 1"/>
+          <p:cNvSpPr>
+            <a:spLocks noGrp="1"/>
+          </p:cNvSpPr>
+          <p:nvPr>
+            <p:ph type="title"/>
+          </p:nvPr>
+        </p:nvSpPr>
+        <p:spPr>
+          <a:xfrm>
+            <a:off x="838200" y="365125"/>
+            <a:ext cx="10515600" cy="768349"/>
+          </a:xfrm>
+        </p:spPr>
+        <p:txBody>
+          <a:bodyPr>
+            <a:normAutofit fontScale="90000"/>
+          </a:bodyPr>
+          <a:lstStyle/>
+          <a:p>
+            <a:r>
+              <a:rPr lang="en-GB" sz="4000" dirty="0" smtClean="0">
+                <a:solidFill>
+                  <a:schemeClr val="accent1"/>
+                </a:solidFill>
+              </a:rPr>
+              <a:t>Phylogenetic Gaussian Processes: Theoretical Result</a:t>
+            </a:r>
+            <a:endParaRPr lang="en-GB" sz="4000" dirty="0">
+              <a:solidFill>
+                <a:schemeClr val="accent1"/>
+              </a:solidFill>
+            </a:endParaRPr>
+          </a:p>
+        </p:txBody>
+      </p:sp>
+      <p:sp>
+        <p:nvSpPr>
+          <p:cNvPr id="18" name="AutoShape 2" descr="Image result for epsrc"/>
+          <p:cNvSpPr>
+            <a:spLocks noChangeAspect="1" noChangeArrowheads="1"/>
+          </p:cNvSpPr>
+          <p:nvPr/>
+        </p:nvSpPr>
+        <p:spPr bwMode="auto">
+          <a:xfrm>
+            <a:off x="155575" y="-144463"/>
+            <a:ext cx="304800" cy="304801"/>
+          </a:xfrm>
+          <a:prstGeom prst="rect">
+            <a:avLst/>
+          </a:prstGeom>
+          <a:noFill/>
+          <a:extLst>
+            <a:ext uri="{909E8E84-426E-40DD-AFC4-6F175D3DCCD1}">
+              <a14:hiddenFill xmlns:a14="http://schemas.microsoft.com/office/drawing/2010/main">
+                <a:solidFill>
+                  <a:srgbClr val="FFFFFF"/>
+                </a:solidFill>
+              </a14:hiddenFill>
+            </a:ext>
+          </a:extLst>
+        </p:spPr>
+        <p:txBody>
+          <a:bodyPr vert="horz" wrap="square" lIns="91440" tIns="45720" rIns="91440" bIns="45720" numCol="1" anchor="t" anchorCtr="0" compatLnSpc="1">
+            <a:prstTxWarp prst="textNoShape">
+              <a:avLst/>
+            </a:prstTxWarp>
+          </a:bodyPr>
+          <a:lstStyle/>
+          <a:p>
+            <a:endParaRPr lang="en-GB"/>
+          </a:p>
+        </p:txBody>
+      </p:sp>
+      <p:pic>
+        <p:nvPicPr>
+          <p:cNvPr id="4" name="Picture 3"/>
+          <p:cNvPicPr>
+            <a:picLocks noChangeAspect="1"/>
+          </p:cNvPicPr>
+          <p:nvPr>
+            <p:custDataLst>
+              <p:tags r:id="rId1"/>
+            </p:custDataLst>
+          </p:nvPr>
+        </p:nvPicPr>
+        <p:blipFill>
+          <a:blip r:embed="rId3" cstate="print">
+            <a:extLst>
+              <a:ext uri="{28A0092B-C50C-407E-A947-70E740481C1C}">
+                <a14:useLocalDpi xmlns:a14="http://schemas.microsoft.com/office/drawing/2010/main" val="0"/>
+              </a:ext>
+            </a:extLst>
+          </a:blip>
+          <a:stretch>
+            <a:fillRect/>
+          </a:stretch>
+        </p:blipFill>
+        <p:spPr>
+          <a:xfrm>
+            <a:off x="1757613" y="1727031"/>
+            <a:ext cx="8676774" cy="4386810"/>
+          </a:xfrm>
+          <a:prstGeom prst="rect">
+            <a:avLst/>
+          </a:prstGeom>
+        </p:spPr>
+      </p:pic>
+    </p:spTree>
+    <p:extLst>
+      <p:ext uri="{BB962C8B-B14F-4D97-AF65-F5344CB8AC3E}">
+        <p14:creationId xmlns:p14="http://schemas.microsoft.com/office/powerpoint/2010/main" val="614434028"/>
+      </p:ext>
+    </p:extLst>
+  </p:cSld>
+  <p:clrMapOvr>
+    <a:masterClrMapping/>
+  </p:clrMapOvr>
+  <p:timing>
+    <p:tnLst>
+      <p:par>
+        <p:cTn id="1" dur="indefinite" restart="never" nodeType="tmRoot"/>
+      </p:par>
+    </p:tnLst>
+  </p:timing>
+</p:sld>
+</file>
+
+<file path=ppt/slides/slide13.xml><?xml version="1.0" encoding="utf-8"?>
+<p:sld xmlns:a="http://schemas.openxmlformats.org/drawingml/2006/main" xmlns:r="http://schemas.openxmlformats.org/officeDocument/2006/relationships" xmlns:p="http://schemas.openxmlformats.org/presentationml/2006/main">
+  <p:cSld>
+    <p:spTree>
+      <p:nvGrpSpPr>
+        <p:cNvPr id="1" name=""/>
+        <p:cNvGrpSpPr/>
+        <p:nvPr/>
+      </p:nvGrpSpPr>
+      <p:grpSpPr>
+        <a:xfrm>
+          <a:off x="0" y="0"/>
+          <a:ext cx="0" cy="0"/>
+          <a:chOff x="0" y="0"/>
+          <a:chExt cx="0" cy="0"/>
+        </a:xfrm>
+      </p:grpSpPr>
+      <p:sp>
+        <p:nvSpPr>
+          <p:cNvPr id="2" name="Title 1"/>
+          <p:cNvSpPr>
+            <a:spLocks noGrp="1"/>
+          </p:cNvSpPr>
+          <p:nvPr>
+            <p:ph type="title"/>
+          </p:nvPr>
+        </p:nvSpPr>
+        <p:spPr>
+          <a:xfrm>
+            <a:off x="838200" y="365125"/>
+            <a:ext cx="10515600" cy="768349"/>
+          </a:xfrm>
+        </p:spPr>
+        <p:txBody>
+          <a:bodyPr>
+            <a:normAutofit/>
+          </a:bodyPr>
+          <a:lstStyle/>
+          <a:p>
+            <a:r>
+              <a:rPr lang="en-GB" sz="4000" dirty="0" smtClean="0">
+                <a:solidFill>
+                  <a:schemeClr val="accent1"/>
+                </a:solidFill>
+              </a:rPr>
+              <a:t>Bat Echolocation Calls: The Phylogenetic Tree</a:t>
+            </a:r>
+            <a:endParaRPr lang="en-GB" sz="4000" dirty="0">
+              <a:solidFill>
+                <a:schemeClr val="accent1"/>
+              </a:solidFill>
+            </a:endParaRPr>
+          </a:p>
+        </p:txBody>
+      </p:sp>
+      <p:sp>
+        <p:nvSpPr>
+          <p:cNvPr id="18" name="AutoShape 2" descr="Image result for epsrc"/>
+          <p:cNvSpPr>
+            <a:spLocks noChangeAspect="1" noChangeArrowheads="1"/>
+          </p:cNvSpPr>
+          <p:nvPr/>
+        </p:nvSpPr>
+        <p:spPr bwMode="auto">
+          <a:xfrm>
+            <a:off x="155575" y="-144463"/>
+            <a:ext cx="304800" cy="304801"/>
+          </a:xfrm>
+          <a:prstGeom prst="rect">
+            <a:avLst/>
+          </a:prstGeom>
+          <a:noFill/>
+          <a:extLst>
+            <a:ext uri="{909E8E84-426E-40DD-AFC4-6F175D3DCCD1}">
+              <a14:hiddenFill xmlns:a14="http://schemas.microsoft.com/office/drawing/2010/main">
+                <a:solidFill>
+                  <a:srgbClr val="FFFFFF"/>
+                </a:solidFill>
+              </a14:hiddenFill>
+            </a:ext>
+          </a:extLst>
+        </p:spPr>
+        <p:txBody>
+          <a:bodyPr vert="horz" wrap="square" lIns="91440" tIns="45720" rIns="91440" bIns="45720" numCol="1" anchor="t" anchorCtr="0" compatLnSpc="1">
+            <a:prstTxWarp prst="textNoShape">
+              <a:avLst/>
+            </a:prstTxWarp>
+          </a:bodyPr>
+          <a:lstStyle/>
+          <a:p>
+            <a:endParaRPr lang="en-GB"/>
+          </a:p>
+        </p:txBody>
+      </p:sp>
+      <p:graphicFrame>
+        <p:nvGraphicFramePr>
+          <p:cNvPr id="6" name="Object 5"/>
+          <p:cNvGraphicFramePr>
+            <a:graphicFrameLocks noChangeAspect="1"/>
+          </p:cNvGraphicFramePr>
+          <p:nvPr>
+            <p:extLst>
+              <p:ext uri="{D42A27DB-BD31-4B8C-83A1-F6EECF244321}">
+                <p14:modId xmlns:p14="http://schemas.microsoft.com/office/powerpoint/2010/main" val="2853659461"/>
+              </p:ext>
+            </p:extLst>
+          </p:nvPr>
+        </p:nvGraphicFramePr>
+        <p:xfrm>
+          <a:off x="2707480" y="1133474"/>
+          <a:ext cx="6764766" cy="4831977"/>
+        </p:xfrm>
+        <a:graphic>
+          <a:graphicData uri="http://schemas.openxmlformats.org/presentationml/2006/ole">
+            <mc:AlternateContent xmlns:mc="http://schemas.openxmlformats.org/markup-compatibility/2006">
+              <mc:Choice xmlns:v="urn:schemas-microsoft-com:vml" Requires="v">
+                <p:oleObj spid="_x0000_s2056" name="Acrobat Document" r:id="rId3" imgW="4800532" imgH="3429000" progId="AcroExch.Document.DC">
+                  <p:embed/>
+                </p:oleObj>
+              </mc:Choice>
+              <mc:Fallback>
+                <p:oleObj name="Acrobat Document" r:id="rId3" imgW="4800532" imgH="3429000" progId="AcroExch.Document.DC">
+                  <p:embed/>
+                  <p:pic>
+                    <p:nvPicPr>
+                      <p:cNvPr id="0" name=""/>
+                      <p:cNvPicPr/>
+                      <p:nvPr/>
+                    </p:nvPicPr>
+                    <p:blipFill>
+                      <a:blip r:embed="rId4"/>
+                      <a:stretch>
+                        <a:fillRect/>
+                      </a:stretch>
+                    </p:blipFill>
+                    <p:spPr>
+                      <a:xfrm>
+                        <a:off x="2707480" y="1133474"/>
+                        <a:ext cx="6764766" cy="4831977"/>
+                      </a:xfrm>
+                      <a:prstGeom prst="rect">
+                        <a:avLst/>
+                      </a:prstGeom>
+                    </p:spPr>
+                  </p:pic>
+                </p:oleObj>
+              </mc:Fallback>
+            </mc:AlternateContent>
+          </a:graphicData>
+        </a:graphic>
+      </p:graphicFrame>
+    </p:spTree>
+    <p:extLst>
+      <p:ext uri="{BB962C8B-B14F-4D97-AF65-F5344CB8AC3E}">
+        <p14:creationId xmlns:p14="http://schemas.microsoft.com/office/powerpoint/2010/main" val="1326531691"/>
+      </p:ext>
+    </p:extLst>
+  </p:cSld>
+  <p:clrMapOvr>
+    <a:masterClrMapping/>
+  </p:clrMapOvr>
+  <p:timing>
+    <p:tnLst>
+      <p:par>
+        <p:cTn id="1" dur="indefinite" restart="never" nodeType="tmRoot"/>
+      </p:par>
+    </p:tnLst>
+  </p:timing>
+</p:sld>
+</file>
+
+<file path=ppt/slides/slide14.xml><?xml version="1.0" encoding="utf-8"?>
+<p:sld xmlns:a="http://schemas.openxmlformats.org/drawingml/2006/main" xmlns:r="http://schemas.openxmlformats.org/officeDocument/2006/relationships" xmlns:p="http://schemas.openxmlformats.org/presentationml/2006/main">
+  <p:cSld>
+    <p:spTree>
+      <p:nvGrpSpPr>
+        <p:cNvPr id="1" name=""/>
+        <p:cNvGrpSpPr/>
+        <p:nvPr/>
+      </p:nvGrpSpPr>
+      <p:grpSpPr>
+        <a:xfrm>
+          <a:off x="0" y="0"/>
+          <a:ext cx="0" cy="0"/>
+          <a:chOff x="0" y="0"/>
+          <a:chExt cx="0" cy="0"/>
+        </a:xfrm>
+      </p:grpSpPr>
+      <p:sp>
+        <p:nvSpPr>
+          <p:cNvPr id="2" name="Title 1"/>
+          <p:cNvSpPr>
+            <a:spLocks noGrp="1"/>
+          </p:cNvSpPr>
+          <p:nvPr>
+            <p:ph type="title"/>
+          </p:nvPr>
+        </p:nvSpPr>
+        <p:spPr>
+          <a:xfrm>
+            <a:off x="838200" y="365125"/>
+            <a:ext cx="10515600" cy="768349"/>
+          </a:xfrm>
+        </p:spPr>
+        <p:txBody>
+          <a:bodyPr>
+            <a:normAutofit/>
+          </a:bodyPr>
+          <a:lstStyle/>
+          <a:p>
+            <a:r>
+              <a:rPr lang="en-GB" sz="4000" dirty="0" smtClean="0">
+                <a:solidFill>
+                  <a:schemeClr val="accent1"/>
+                </a:solidFill>
+              </a:rPr>
+              <a:t>Bat Echolocation Calls: A Function-Valued Trait</a:t>
+            </a:r>
+            <a:endParaRPr lang="en-GB" sz="4000" dirty="0">
+              <a:solidFill>
+                <a:schemeClr val="accent1"/>
+              </a:solidFill>
+            </a:endParaRPr>
+          </a:p>
+        </p:txBody>
+      </p:sp>
+      <p:sp>
+        <p:nvSpPr>
+          <p:cNvPr id="18" name="AutoShape 2" descr="Image result for epsrc"/>
+          <p:cNvSpPr>
+            <a:spLocks noChangeAspect="1" noChangeArrowheads="1"/>
+          </p:cNvSpPr>
+          <p:nvPr/>
+        </p:nvSpPr>
+        <p:spPr bwMode="auto">
+          <a:xfrm>
+            <a:off x="155575" y="-144463"/>
+            <a:ext cx="304800" cy="304801"/>
+          </a:xfrm>
+          <a:prstGeom prst="rect">
+            <a:avLst/>
+          </a:prstGeom>
+          <a:noFill/>
+          <a:extLst>
+            <a:ext uri="{909E8E84-426E-40DD-AFC4-6F175D3DCCD1}">
+              <a14:hiddenFill xmlns:a14="http://schemas.microsoft.com/office/drawing/2010/main">
+                <a:solidFill>
+                  <a:srgbClr val="FFFFFF"/>
+                </a:solidFill>
+              </a14:hiddenFill>
+            </a:ext>
+          </a:extLst>
+        </p:spPr>
+        <p:txBody>
+          <a:bodyPr vert="horz" wrap="square" lIns="91440" tIns="45720" rIns="91440" bIns="45720" numCol="1" anchor="t" anchorCtr="0" compatLnSpc="1">
+            <a:prstTxWarp prst="textNoShape">
+              <a:avLst/>
+            </a:prstTxWarp>
+          </a:bodyPr>
+          <a:lstStyle/>
+          <a:p>
+            <a:endParaRPr lang="en-GB"/>
+          </a:p>
+        </p:txBody>
+      </p:sp>
+      <p:graphicFrame>
+        <p:nvGraphicFramePr>
+          <p:cNvPr id="3" name="Object 2"/>
+          <p:cNvGraphicFramePr>
+            <a:graphicFrameLocks noChangeAspect="1"/>
+          </p:cNvGraphicFramePr>
+          <p:nvPr>
+            <p:extLst>
+              <p:ext uri="{D42A27DB-BD31-4B8C-83A1-F6EECF244321}">
+                <p14:modId xmlns:p14="http://schemas.microsoft.com/office/powerpoint/2010/main" val="615043804"/>
+              </p:ext>
+            </p:extLst>
+          </p:nvPr>
+        </p:nvGraphicFramePr>
+        <p:xfrm>
+          <a:off x="460375" y="2202352"/>
+          <a:ext cx="3533887" cy="3029046"/>
+        </p:xfrm>
+        <a:graphic>
+          <a:graphicData uri="http://schemas.openxmlformats.org/presentationml/2006/ole">
+            <mc:AlternateContent xmlns:mc="http://schemas.openxmlformats.org/markup-compatibility/2006">
+              <mc:Choice xmlns:v="urn:schemas-microsoft-com:vml" Requires="v">
+                <p:oleObj spid="_x0000_s3089" name="Acrobat Document" r:id="rId3" imgW="4800532" imgH="4114800" progId="AcroExch.Document.DC">
+                  <p:embed/>
+                </p:oleObj>
+              </mc:Choice>
+              <mc:Fallback>
+                <p:oleObj name="Acrobat Document" r:id="rId3" imgW="4800532" imgH="4114800" progId="AcroExch.Document.DC">
+                  <p:embed/>
+                  <p:pic>
+                    <p:nvPicPr>
+                      <p:cNvPr id="0" name=""/>
+                      <p:cNvPicPr/>
+                      <p:nvPr/>
+                    </p:nvPicPr>
+                    <p:blipFill>
+                      <a:blip r:embed="rId4"/>
+                      <a:stretch>
+                        <a:fillRect/>
+                      </a:stretch>
+                    </p:blipFill>
+                    <p:spPr>
+                      <a:xfrm>
+                        <a:off x="460375" y="2202352"/>
+                        <a:ext cx="3533887" cy="3029046"/>
+                      </a:xfrm>
+                      <a:prstGeom prst="rect">
+                        <a:avLst/>
+                      </a:prstGeom>
+                    </p:spPr>
+                  </p:pic>
+                </p:oleObj>
+              </mc:Fallback>
+            </mc:AlternateContent>
+          </a:graphicData>
+        </a:graphic>
+      </p:graphicFrame>
+      <p:graphicFrame>
+        <p:nvGraphicFramePr>
+          <p:cNvPr id="4" name="Object 3"/>
+          <p:cNvGraphicFramePr>
+            <a:graphicFrameLocks noChangeAspect="1"/>
+          </p:cNvGraphicFramePr>
+          <p:nvPr>
+            <p:extLst>
+              <p:ext uri="{D42A27DB-BD31-4B8C-83A1-F6EECF244321}">
+                <p14:modId xmlns:p14="http://schemas.microsoft.com/office/powerpoint/2010/main" val="1712845183"/>
+              </p:ext>
+            </p:extLst>
+          </p:nvPr>
+        </p:nvGraphicFramePr>
+        <p:xfrm>
+          <a:off x="4329056" y="2202352"/>
+          <a:ext cx="3533887" cy="3029046"/>
+        </p:xfrm>
+        <a:graphic>
+          <a:graphicData uri="http://schemas.openxmlformats.org/presentationml/2006/ole">
+            <mc:AlternateContent xmlns:mc="http://schemas.openxmlformats.org/markup-compatibility/2006">
+              <mc:Choice xmlns:v="urn:schemas-microsoft-com:vml" Requires="v">
+                <p:oleObj spid="_x0000_s3090" name="Acrobat Document" r:id="rId5" imgW="4800532" imgH="4114800" progId="AcroExch.Document.DC">
+                  <p:embed/>
+                </p:oleObj>
+              </mc:Choice>
+              <mc:Fallback>
+                <p:oleObj name="Acrobat Document" r:id="rId5" imgW="4800532" imgH="4114800" progId="AcroExch.Document.DC">
+                  <p:embed/>
+                  <p:pic>
+                    <p:nvPicPr>
+                      <p:cNvPr id="0" name=""/>
+                      <p:cNvPicPr/>
+                      <p:nvPr/>
+                    </p:nvPicPr>
+                    <p:blipFill>
+                      <a:blip r:embed="rId6"/>
+                      <a:stretch>
+                        <a:fillRect/>
+                      </a:stretch>
+                    </p:blipFill>
+                    <p:spPr>
+                      <a:xfrm>
+                        <a:off x="4329056" y="2202352"/>
+                        <a:ext cx="3533887" cy="3029046"/>
+                      </a:xfrm>
+                      <a:prstGeom prst="rect">
+                        <a:avLst/>
+                      </a:prstGeom>
+                    </p:spPr>
+                  </p:pic>
+                </p:oleObj>
+              </mc:Fallback>
+            </mc:AlternateContent>
+          </a:graphicData>
+        </a:graphic>
+      </p:graphicFrame>
+      <p:graphicFrame>
+        <p:nvGraphicFramePr>
+          <p:cNvPr id="5" name="Object 4"/>
+          <p:cNvGraphicFramePr>
+            <a:graphicFrameLocks noChangeAspect="1"/>
+          </p:cNvGraphicFramePr>
+          <p:nvPr>
+            <p:extLst>
+              <p:ext uri="{D42A27DB-BD31-4B8C-83A1-F6EECF244321}">
+                <p14:modId xmlns:p14="http://schemas.microsoft.com/office/powerpoint/2010/main" val="177134473"/>
+              </p:ext>
+            </p:extLst>
+          </p:nvPr>
+        </p:nvGraphicFramePr>
+        <p:xfrm>
+          <a:off x="8197737" y="2202352"/>
+          <a:ext cx="3533887" cy="3029046"/>
+        </p:xfrm>
+        <a:graphic>
+          <a:graphicData uri="http://schemas.openxmlformats.org/presentationml/2006/ole">
+            <mc:AlternateContent xmlns:mc="http://schemas.openxmlformats.org/markup-compatibility/2006">
+              <mc:Choice xmlns:v="urn:schemas-microsoft-com:vml" Requires="v">
+                <p:oleObj spid="_x0000_s3091" name="Acrobat Document" r:id="rId7" imgW="4800532" imgH="4114800" progId="AcroExch.Document.DC">
+                  <p:embed/>
+                </p:oleObj>
+              </mc:Choice>
+              <mc:Fallback>
+                <p:oleObj name="Acrobat Document" r:id="rId7" imgW="4800532" imgH="4114800" progId="AcroExch.Document.DC">
+                  <p:embed/>
+                  <p:pic>
+                    <p:nvPicPr>
+                      <p:cNvPr id="0" name=""/>
+                      <p:cNvPicPr/>
+                      <p:nvPr/>
+                    </p:nvPicPr>
+                    <p:blipFill>
+                      <a:blip r:embed="rId8"/>
+                      <a:stretch>
+                        <a:fillRect/>
+                      </a:stretch>
+                    </p:blipFill>
+                    <p:spPr>
+                      <a:xfrm>
+                        <a:off x="8197737" y="2202352"/>
+                        <a:ext cx="3533887" cy="3029046"/>
+                      </a:xfrm>
+                      <a:prstGeom prst="rect">
+                        <a:avLst/>
+                      </a:prstGeom>
+                    </p:spPr>
+                  </p:pic>
+                </p:oleObj>
+              </mc:Fallback>
+            </mc:AlternateContent>
+          </a:graphicData>
+        </a:graphic>
+      </p:graphicFrame>
+    </p:spTree>
+    <p:extLst>
+      <p:ext uri="{BB962C8B-B14F-4D97-AF65-F5344CB8AC3E}">
+        <p14:creationId xmlns:p14="http://schemas.microsoft.com/office/powerpoint/2010/main" val="383963877"/>
+      </p:ext>
+    </p:extLst>
+  </p:cSld>
+  <p:clrMapOvr>
+    <a:masterClrMapping/>
+  </p:clrMapOvr>
+  <p:timing>
+    <p:tnLst>
+      <p:par>
+        <p:cTn id="1" dur="indefinite" restart="never" nodeType="tmRoot"/>
+      </p:par>
+    </p:tnLst>
+  </p:timing>
+</p:sld>
+</file>
+
+<file path=ppt/slides/slide15.xml><?xml version="1.0" encoding="utf-8"?>
+<p:sld xmlns:a="http://schemas.openxmlformats.org/drawingml/2006/main" xmlns:r="http://schemas.openxmlformats.org/officeDocument/2006/relationships" xmlns:p="http://schemas.openxmlformats.org/presentationml/2006/main">
+  <p:cSld>
+    <p:spTree>
+      <p:nvGrpSpPr>
+        <p:cNvPr id="1" name=""/>
+        <p:cNvGrpSpPr/>
+        <p:nvPr/>
+      </p:nvGrpSpPr>
+      <p:grpSpPr>
+        <a:xfrm>
+          <a:off x="0" y="0"/>
+          <a:ext cx="0" cy="0"/>
+          <a:chOff x="0" y="0"/>
+          <a:chExt cx="0" cy="0"/>
+        </a:xfrm>
+      </p:grpSpPr>
+      <p:sp>
+        <p:nvSpPr>
+          <p:cNvPr id="2" name="Title 1"/>
+          <p:cNvSpPr>
+            <a:spLocks noGrp="1"/>
+          </p:cNvSpPr>
+          <p:nvPr>
+            <p:ph type="title"/>
+          </p:nvPr>
+        </p:nvSpPr>
+        <p:spPr>
+          <a:xfrm>
+            <a:off x="838200" y="365125"/>
+            <a:ext cx="10515600" cy="768349"/>
+          </a:xfrm>
+        </p:spPr>
+        <p:txBody>
+          <a:bodyPr>
+            <a:normAutofit/>
+          </a:bodyPr>
+          <a:lstStyle/>
+          <a:p>
+            <a:r>
+              <a:rPr lang="en-GB" sz="4000" dirty="0" smtClean="0">
+                <a:solidFill>
+                  <a:schemeClr val="accent1"/>
+                </a:solidFill>
+              </a:rPr>
+              <a:t>Bat Echolocation Calls: Independent Basis</a:t>
+            </a:r>
+            <a:endParaRPr lang="en-GB" sz="4000" dirty="0">
+              <a:solidFill>
+                <a:schemeClr val="accent1"/>
+              </a:solidFill>
+            </a:endParaRPr>
+          </a:p>
+        </p:txBody>
+      </p:sp>
+      <p:sp>
+        <p:nvSpPr>
+          <p:cNvPr id="18" name="AutoShape 2" descr="Image result for epsrc"/>
+          <p:cNvSpPr>
+            <a:spLocks noChangeAspect="1" noChangeArrowheads="1"/>
+          </p:cNvSpPr>
+          <p:nvPr/>
+        </p:nvSpPr>
+        <p:spPr bwMode="auto">
+          <a:xfrm>
+            <a:off x="155575" y="-144463"/>
+            <a:ext cx="304800" cy="304801"/>
+          </a:xfrm>
+          <a:prstGeom prst="rect">
+            <a:avLst/>
+          </a:prstGeom>
+          <a:noFill/>
+          <a:extLst>
+            <a:ext uri="{909E8E84-426E-40DD-AFC4-6F175D3DCCD1}">
+              <a14:hiddenFill xmlns:a14="http://schemas.microsoft.com/office/drawing/2010/main">
+                <a:solidFill>
+                  <a:srgbClr val="FFFFFF"/>
+                </a:solidFill>
+              </a14:hiddenFill>
+            </a:ext>
+          </a:extLst>
+        </p:spPr>
+        <p:txBody>
+          <a:bodyPr vert="horz" wrap="square" lIns="91440" tIns="45720" rIns="91440" bIns="45720" numCol="1" anchor="t" anchorCtr="0" compatLnSpc="1">
+            <a:prstTxWarp prst="textNoShape">
+              <a:avLst/>
+            </a:prstTxWarp>
+          </a:bodyPr>
+          <a:lstStyle/>
+          <a:p>
+            <a:endParaRPr lang="en-GB"/>
+          </a:p>
+        </p:txBody>
+      </p:sp>
+      <p:graphicFrame>
+        <p:nvGraphicFramePr>
+          <p:cNvPr id="6" name="Object 5"/>
+          <p:cNvGraphicFramePr>
+            <a:graphicFrameLocks noChangeAspect="1"/>
+          </p:cNvGraphicFramePr>
+          <p:nvPr>
+            <p:extLst>
+              <p:ext uri="{D42A27DB-BD31-4B8C-83A1-F6EECF244321}">
+                <p14:modId xmlns:p14="http://schemas.microsoft.com/office/powerpoint/2010/main" val="2203224063"/>
+              </p:ext>
+            </p:extLst>
+          </p:nvPr>
+        </p:nvGraphicFramePr>
+        <p:xfrm>
+          <a:off x="2563144" y="1279858"/>
+          <a:ext cx="7062119" cy="5044371"/>
+        </p:xfrm>
+        <a:graphic>
+          <a:graphicData uri="http://schemas.openxmlformats.org/presentationml/2006/ole">
+            <mc:AlternateContent xmlns:mc="http://schemas.openxmlformats.org/markup-compatibility/2006">
+              <mc:Choice xmlns:v="urn:schemas-microsoft-com:vml" Requires="v">
+                <p:oleObj spid="_x0000_s4103" name="Acrobat Document" r:id="rId3" imgW="4800532" imgH="3429000" progId="AcroExch.Document.DC">
+                  <p:embed/>
+                </p:oleObj>
+              </mc:Choice>
+              <mc:Fallback>
+                <p:oleObj name="Acrobat Document" r:id="rId3" imgW="4800532" imgH="3429000" progId="AcroExch.Document.DC">
+                  <p:embed/>
+                  <p:pic>
+                    <p:nvPicPr>
+                      <p:cNvPr id="0" name=""/>
+                      <p:cNvPicPr/>
+                      <p:nvPr/>
+                    </p:nvPicPr>
+                    <p:blipFill>
+                      <a:blip r:embed="rId4"/>
+                      <a:stretch>
+                        <a:fillRect/>
+                      </a:stretch>
+                    </p:blipFill>
+                    <p:spPr>
+                      <a:xfrm>
+                        <a:off x="2563144" y="1279858"/>
+                        <a:ext cx="7062119" cy="5044371"/>
+                      </a:xfrm>
+                      <a:prstGeom prst="rect">
+                        <a:avLst/>
+                      </a:prstGeom>
+                    </p:spPr>
+                  </p:pic>
+                </p:oleObj>
+              </mc:Fallback>
+            </mc:AlternateContent>
+          </a:graphicData>
+        </a:graphic>
+      </p:graphicFrame>
+    </p:spTree>
+    <p:extLst>
+      <p:ext uri="{BB962C8B-B14F-4D97-AF65-F5344CB8AC3E}">
+        <p14:creationId xmlns:p14="http://schemas.microsoft.com/office/powerpoint/2010/main" val="2398504247"/>
+      </p:ext>
+    </p:extLst>
+  </p:cSld>
+  <p:clrMapOvr>
+    <a:masterClrMapping/>
+  </p:clrMapOvr>
+  <p:timing>
+    <p:tnLst>
+      <p:par>
+        <p:cTn id="1" dur="indefinite" restart="never" nodeType="tmRoot"/>
+      </p:par>
+    </p:tnLst>
+  </p:timing>
+</p:sld>
+</file>
+
+<file path=ppt/slides/slide16.xml><?xml version="1.0" encoding="utf-8"?>
+<p:sld xmlns:a="http://schemas.openxmlformats.org/drawingml/2006/main" xmlns:r="http://schemas.openxmlformats.org/officeDocument/2006/relationships" xmlns:p="http://schemas.openxmlformats.org/presentationml/2006/main">
+  <p:cSld>
+    <p:spTree>
+      <p:nvGrpSpPr>
+        <p:cNvPr id="1" name=""/>
+        <p:cNvGrpSpPr/>
+        <p:nvPr/>
+      </p:nvGrpSpPr>
+      <p:grpSpPr>
+        <a:xfrm>
+          <a:off x="0" y="0"/>
+          <a:ext cx="0" cy="0"/>
+          <a:chOff x="0" y="0"/>
+          <a:chExt cx="0" cy="0"/>
+        </a:xfrm>
+      </p:grpSpPr>
+      <p:sp>
+        <p:nvSpPr>
+          <p:cNvPr id="2" name="Title 1"/>
+          <p:cNvSpPr>
+            <a:spLocks noGrp="1"/>
+          </p:cNvSpPr>
+          <p:nvPr>
+            <p:ph type="title"/>
+          </p:nvPr>
+        </p:nvSpPr>
+        <p:spPr>
+          <a:xfrm>
+            <a:off x="838200" y="365125"/>
+            <a:ext cx="10515600" cy="768349"/>
+          </a:xfrm>
+        </p:spPr>
+        <p:txBody>
+          <a:bodyPr>
+            <a:normAutofit/>
+          </a:bodyPr>
+          <a:lstStyle/>
+          <a:p>
+            <a:r>
+              <a:rPr lang="en-GB" sz="4000" dirty="0" smtClean="0">
+                <a:solidFill>
+                  <a:schemeClr val="accent1"/>
+                </a:solidFill>
+              </a:rPr>
+              <a:t>Results: Phylogenetic Ornstein-</a:t>
+            </a:r>
+            <a:r>
+              <a:rPr lang="en-GB" sz="4000" dirty="0" err="1" smtClean="0">
+                <a:solidFill>
+                  <a:schemeClr val="accent1"/>
+                </a:solidFill>
+              </a:rPr>
+              <a:t>Uhlenbeck</a:t>
+            </a:r>
+            <a:r>
+              <a:rPr lang="en-GB" sz="4000" dirty="0" smtClean="0">
+                <a:solidFill>
+                  <a:schemeClr val="accent1"/>
+                </a:solidFill>
+              </a:rPr>
+              <a:t> Process</a:t>
+            </a:r>
+            <a:endParaRPr lang="en-GB" sz="4000" dirty="0">
+              <a:solidFill>
+                <a:schemeClr val="accent1"/>
+              </a:solidFill>
+            </a:endParaRPr>
+          </a:p>
+        </p:txBody>
+      </p:sp>
+      <p:sp>
+        <p:nvSpPr>
+          <p:cNvPr id="18" name="AutoShape 2" descr="Image result for epsrc"/>
+          <p:cNvSpPr>
+            <a:spLocks noChangeAspect="1" noChangeArrowheads="1"/>
+          </p:cNvSpPr>
+          <p:nvPr/>
+        </p:nvSpPr>
+        <p:spPr bwMode="auto">
+          <a:xfrm>
+            <a:off x="155575" y="-144463"/>
+            <a:ext cx="304800" cy="304801"/>
+          </a:xfrm>
+          <a:prstGeom prst="rect">
+            <a:avLst/>
+          </a:prstGeom>
+          <a:noFill/>
+          <a:extLst>
+            <a:ext uri="{909E8E84-426E-40DD-AFC4-6F175D3DCCD1}">
+              <a14:hiddenFill xmlns:a14="http://schemas.microsoft.com/office/drawing/2010/main">
+                <a:solidFill>
+                  <a:srgbClr val="FFFFFF"/>
+                </a:solidFill>
+              </a14:hiddenFill>
+            </a:ext>
+          </a:extLst>
+        </p:spPr>
+        <p:txBody>
+          <a:bodyPr vert="horz" wrap="square" lIns="91440" tIns="45720" rIns="91440" bIns="45720" numCol="1" anchor="t" anchorCtr="0" compatLnSpc="1">
+            <a:prstTxWarp prst="textNoShape">
+              <a:avLst/>
+            </a:prstTxWarp>
+          </a:bodyPr>
+          <a:lstStyle/>
+          <a:p>
+            <a:endParaRPr lang="en-GB"/>
+          </a:p>
+        </p:txBody>
+      </p:sp>
+      <p:pic>
+        <p:nvPicPr>
+          <p:cNvPr id="4" name="Picture 3"/>
+          <p:cNvPicPr>
+            <a:picLocks noChangeAspect="1"/>
+          </p:cNvPicPr>
+          <p:nvPr>
+            <p:custDataLst>
+              <p:tags r:id="rId1"/>
+            </p:custDataLst>
+          </p:nvPr>
+        </p:nvPicPr>
+        <p:blipFill>
+          <a:blip r:embed="rId3" cstate="print">
+            <a:extLst>
+              <a:ext uri="{28A0092B-C50C-407E-A947-70E740481C1C}">
+                <a14:useLocalDpi xmlns:a14="http://schemas.microsoft.com/office/drawing/2010/main" val="0"/>
+              </a:ext>
+            </a:extLst>
+          </a:blip>
+          <a:stretch>
+            <a:fillRect/>
+          </a:stretch>
+        </p:blipFill>
+        <p:spPr>
+          <a:xfrm>
+            <a:off x="2628023" y="3117513"/>
+            <a:ext cx="6935954" cy="824381"/>
+          </a:xfrm>
+          <a:prstGeom prst="rect">
+            <a:avLst/>
+          </a:prstGeom>
+        </p:spPr>
+      </p:pic>
+    </p:spTree>
+    <p:extLst>
+      <p:ext uri="{BB962C8B-B14F-4D97-AF65-F5344CB8AC3E}">
+        <p14:creationId xmlns:p14="http://schemas.microsoft.com/office/powerpoint/2010/main" val="964884410"/>
+      </p:ext>
+    </p:extLst>
+  </p:cSld>
+  <p:clrMapOvr>
+    <a:masterClrMapping/>
+  </p:clrMapOvr>
+  <p:timing>
+    <p:tnLst>
+      <p:par>
+        <p:cTn id="1" dur="indefinite" restart="never" nodeType="tmRoot"/>
+      </p:par>
+    </p:tnLst>
+  </p:timing>
+</p:sld>
+</file>
+
+<file path=ppt/slides/slide17.xml><?xml version="1.0" encoding="utf-8"?>
+<p:sld xmlns:a="http://schemas.openxmlformats.org/drawingml/2006/main" xmlns:r="http://schemas.openxmlformats.org/officeDocument/2006/relationships" xmlns:p="http://schemas.openxmlformats.org/presentationml/2006/main">
+  <p:cSld>
+    <p:spTree>
+      <p:nvGrpSpPr>
+        <p:cNvPr id="1" name=""/>
+        <p:cNvGrpSpPr/>
+        <p:nvPr/>
+      </p:nvGrpSpPr>
+      <p:grpSpPr>
+        <a:xfrm>
+          <a:off x="0" y="0"/>
+          <a:ext cx="0" cy="0"/>
+          <a:chOff x="0" y="0"/>
+          <a:chExt cx="0" cy="0"/>
+        </a:xfrm>
+      </p:grpSpPr>
+      <p:sp>
+        <p:nvSpPr>
+          <p:cNvPr id="2" name="Title 1"/>
+          <p:cNvSpPr>
+            <a:spLocks noGrp="1"/>
+          </p:cNvSpPr>
+          <p:nvPr>
+            <p:ph type="title"/>
+          </p:nvPr>
+        </p:nvSpPr>
+        <p:spPr>
+          <a:xfrm>
+            <a:off x="838200" y="365125"/>
+            <a:ext cx="10515600" cy="768349"/>
+          </a:xfrm>
+        </p:spPr>
+        <p:txBody>
+          <a:bodyPr>
+            <a:normAutofit/>
+          </a:bodyPr>
+          <a:lstStyle/>
+          <a:p>
+            <a:r>
+              <a:rPr lang="en-GB" sz="4000" dirty="0" smtClean="0">
+                <a:solidFill>
+                  <a:schemeClr val="accent1"/>
+                </a:solidFill>
+              </a:rPr>
+              <a:t>Results: </a:t>
+            </a:r>
+            <a:r>
+              <a:rPr lang="en-GB" sz="4000" dirty="0" err="1" smtClean="0">
+                <a:solidFill>
+                  <a:schemeClr val="accent1"/>
+                </a:solidFill>
+              </a:rPr>
+              <a:t>Hyperparameter</a:t>
+            </a:r>
+            <a:r>
+              <a:rPr lang="en-GB" sz="4000" dirty="0" smtClean="0">
+                <a:solidFill>
+                  <a:schemeClr val="accent1"/>
+                </a:solidFill>
+              </a:rPr>
+              <a:t> Estimates</a:t>
+            </a:r>
+            <a:endParaRPr lang="en-GB" sz="4000" dirty="0">
+              <a:solidFill>
+                <a:schemeClr val="accent1"/>
+              </a:solidFill>
+            </a:endParaRPr>
+          </a:p>
+        </p:txBody>
+      </p:sp>
+      <p:sp>
+        <p:nvSpPr>
+          <p:cNvPr id="18" name="AutoShape 2" descr="Image result for epsrc"/>
+          <p:cNvSpPr>
+            <a:spLocks noChangeAspect="1" noChangeArrowheads="1"/>
+          </p:cNvSpPr>
+          <p:nvPr/>
+        </p:nvSpPr>
+        <p:spPr bwMode="auto">
+          <a:xfrm>
+            <a:off x="155575" y="-144463"/>
+            <a:ext cx="304800" cy="304801"/>
+          </a:xfrm>
+          <a:prstGeom prst="rect">
+            <a:avLst/>
+          </a:prstGeom>
+          <a:noFill/>
+          <a:extLst>
+            <a:ext uri="{909E8E84-426E-40DD-AFC4-6F175D3DCCD1}">
+              <a14:hiddenFill xmlns:a14="http://schemas.microsoft.com/office/drawing/2010/main">
+                <a:solidFill>
+                  <a:srgbClr val="FFFFFF"/>
+                </a:solidFill>
+              </a14:hiddenFill>
+            </a:ext>
+          </a:extLst>
+        </p:spPr>
+        <p:txBody>
+          <a:bodyPr vert="horz" wrap="square" lIns="91440" tIns="45720" rIns="91440" bIns="45720" numCol="1" anchor="t" anchorCtr="0" compatLnSpc="1">
+            <a:prstTxWarp prst="textNoShape">
+              <a:avLst/>
+            </a:prstTxWarp>
+          </a:bodyPr>
+          <a:lstStyle/>
+          <a:p>
+            <a:endParaRPr lang="en-GB"/>
+          </a:p>
+        </p:txBody>
+      </p:sp>
+      <p:pic>
+        <p:nvPicPr>
+          <p:cNvPr id="7" name="Picture 6"/>
+          <p:cNvPicPr>
+            <a:picLocks noChangeAspect="1"/>
+          </p:cNvPicPr>
+          <p:nvPr>
+            <p:custDataLst>
+              <p:tags r:id="rId1"/>
+            </p:custDataLst>
+          </p:nvPr>
+        </p:nvPicPr>
+        <p:blipFill>
+          <a:blip r:embed="rId3" cstate="print">
+            <a:extLst>
+              <a:ext uri="{28A0092B-C50C-407E-A947-70E740481C1C}">
+                <a14:useLocalDpi xmlns:a14="http://schemas.microsoft.com/office/drawing/2010/main" val="0"/>
+              </a:ext>
+            </a:extLst>
+          </a:blip>
+          <a:stretch>
+            <a:fillRect/>
+          </a:stretch>
+        </p:blipFill>
+        <p:spPr>
+          <a:xfrm>
+            <a:off x="2538147" y="2267281"/>
+            <a:ext cx="7115706" cy="2882233"/>
+          </a:xfrm>
+          <a:prstGeom prst="rect">
+            <a:avLst/>
+          </a:prstGeom>
+        </p:spPr>
+      </p:pic>
+    </p:spTree>
+    <p:extLst>
+      <p:ext uri="{BB962C8B-B14F-4D97-AF65-F5344CB8AC3E}">
+        <p14:creationId xmlns:p14="http://schemas.microsoft.com/office/powerpoint/2010/main" val="1008338878"/>
+      </p:ext>
+    </p:extLst>
+  </p:cSld>
+  <p:clrMapOvr>
+    <a:masterClrMapping/>
+  </p:clrMapOvr>
+  <p:timing>
+    <p:tnLst>
+      <p:par>
+        <p:cTn id="1" dur="indefinite" restart="never" nodeType="tmRoot"/>
+      </p:par>
+    </p:tnLst>
+  </p:timing>
+</p:sld>
+</file>
+
+<file path=ppt/slides/slide18.xml><?xml version="1.0" encoding="utf-8"?>
+<p:sld xmlns:a="http://schemas.openxmlformats.org/drawingml/2006/main" xmlns:r="http://schemas.openxmlformats.org/officeDocument/2006/relationships" xmlns:p="http://schemas.openxmlformats.org/presentationml/2006/main">
+  <p:cSld>
+    <p:spTree>
+      <p:nvGrpSpPr>
+        <p:cNvPr id="1" name=""/>
+        <p:cNvGrpSpPr/>
+        <p:nvPr/>
+      </p:nvGrpSpPr>
+      <p:grpSpPr>
+        <a:xfrm>
+          <a:off x="0" y="0"/>
+          <a:ext cx="0" cy="0"/>
+          <a:chOff x="0" y="0"/>
+          <a:chExt cx="0" cy="0"/>
+        </a:xfrm>
+      </p:grpSpPr>
+      <p:sp>
+        <p:nvSpPr>
+          <p:cNvPr id="2" name="Title 1"/>
+          <p:cNvSpPr>
+            <a:spLocks noGrp="1"/>
+          </p:cNvSpPr>
+          <p:nvPr>
+            <p:ph type="title"/>
+          </p:nvPr>
+        </p:nvSpPr>
+        <p:spPr>
+          <a:xfrm>
+            <a:off x="838200" y="365125"/>
+            <a:ext cx="10515600" cy="768349"/>
+          </a:xfrm>
+        </p:spPr>
+        <p:txBody>
+          <a:bodyPr>
+            <a:normAutofit/>
+          </a:bodyPr>
+          <a:lstStyle/>
+          <a:p>
+            <a:r>
+              <a:rPr lang="en-GB" sz="4000" dirty="0" smtClean="0">
+                <a:solidFill>
+                  <a:schemeClr val="accent1"/>
+                </a:solidFill>
+              </a:rPr>
+              <a:t>Results: </a:t>
+            </a:r>
+            <a:r>
+              <a:rPr lang="en-GB" sz="4000" dirty="0" err="1" smtClean="0">
+                <a:solidFill>
+                  <a:schemeClr val="accent1"/>
+                </a:solidFill>
+              </a:rPr>
+              <a:t>Hyperparameter</a:t>
+            </a:r>
+            <a:r>
+              <a:rPr lang="en-GB" sz="4000" dirty="0" smtClean="0">
+                <a:solidFill>
+                  <a:schemeClr val="accent1"/>
+                </a:solidFill>
+              </a:rPr>
+              <a:t> Estimates</a:t>
+            </a:r>
+            <a:endParaRPr lang="en-GB" sz="4000" dirty="0">
+              <a:solidFill>
+                <a:schemeClr val="accent1"/>
+              </a:solidFill>
+            </a:endParaRPr>
+          </a:p>
+        </p:txBody>
+      </p:sp>
+      <p:sp>
+        <p:nvSpPr>
+          <p:cNvPr id="18" name="AutoShape 2" descr="Image result for epsrc"/>
+          <p:cNvSpPr>
+            <a:spLocks noChangeAspect="1" noChangeArrowheads="1"/>
+          </p:cNvSpPr>
+          <p:nvPr/>
+        </p:nvSpPr>
+        <p:spPr bwMode="auto">
+          <a:xfrm>
+            <a:off x="155575" y="-144463"/>
+            <a:ext cx="304800" cy="304801"/>
+          </a:xfrm>
+          <a:prstGeom prst="rect">
+            <a:avLst/>
+          </a:prstGeom>
+          <a:noFill/>
+          <a:extLst>
+            <a:ext uri="{909E8E84-426E-40DD-AFC4-6F175D3DCCD1}">
+              <a14:hiddenFill xmlns:a14="http://schemas.microsoft.com/office/drawing/2010/main">
+                <a:solidFill>
+                  <a:srgbClr val="FFFFFF"/>
+                </a:solidFill>
+              </a14:hiddenFill>
+            </a:ext>
+          </a:extLst>
+        </p:spPr>
+        <p:txBody>
+          <a:bodyPr vert="horz" wrap="square" lIns="91440" tIns="45720" rIns="91440" bIns="45720" numCol="1" anchor="t" anchorCtr="0" compatLnSpc="1">
+            <a:prstTxWarp prst="textNoShape">
+              <a:avLst/>
+            </a:prstTxWarp>
+          </a:bodyPr>
+          <a:lstStyle/>
+          <a:p>
+            <a:endParaRPr lang="en-GB"/>
+          </a:p>
+        </p:txBody>
+      </p:sp>
+      <p:pic>
+        <p:nvPicPr>
+          <p:cNvPr id="3" name="Picture 2"/>
+          <p:cNvPicPr>
+            <a:picLocks noChangeAspect="1"/>
+          </p:cNvPicPr>
+          <p:nvPr>
+            <p:custDataLst>
+              <p:tags r:id="rId1"/>
+            </p:custDataLst>
+          </p:nvPr>
+        </p:nvPicPr>
+        <p:blipFill>
+          <a:blip r:embed="rId3" cstate="print">
+            <a:extLst>
+              <a:ext uri="{28A0092B-C50C-407E-A947-70E740481C1C}">
+                <a14:useLocalDpi xmlns:a14="http://schemas.microsoft.com/office/drawing/2010/main" val="0"/>
+              </a:ext>
+            </a:extLst>
+          </a:blip>
+          <a:stretch>
+            <a:fillRect/>
+          </a:stretch>
+        </p:blipFill>
+        <p:spPr>
+          <a:xfrm>
+            <a:off x="2538147" y="2267281"/>
+            <a:ext cx="7115706" cy="2882233"/>
+          </a:xfrm>
+          <a:prstGeom prst="rect">
+            <a:avLst/>
+          </a:prstGeom>
+        </p:spPr>
+      </p:pic>
+      <p:sp>
+        <p:nvSpPr>
+          <p:cNvPr id="4" name="Rectangle 3"/>
+          <p:cNvSpPr/>
+          <p:nvPr/>
+        </p:nvSpPr>
+        <p:spPr>
+          <a:xfrm>
+            <a:off x="2582779" y="3529263"/>
+            <a:ext cx="7170821" cy="368969"/>
+          </a:xfrm>
+          <a:prstGeom prst="rect">
+            <a:avLst/>
+          </a:prstGeom>
+          <a:noFill/>
+          <a:ln w="38100">
+            <a:solidFill>
+              <a:srgbClr val="FF0000"/>
+            </a:solidFill>
+          </a:ln>
+        </p:spPr>
+        <p:style>
+          <a:lnRef idx="2">
+            <a:schemeClr val="accent1">
+              <a:shade val="50000"/>
+            </a:schemeClr>
+          </a:lnRef>
+          <a:fillRef idx="1">
+            <a:schemeClr val="accent1"/>
+          </a:fillRef>
+          <a:effectRef idx="0">
+            <a:schemeClr val="accent1"/>
+          </a:effectRef>
+          <a:fontRef idx="minor">
+            <a:schemeClr val="lt1"/>
+          </a:fontRef>
+        </p:style>
+        <p:txBody>
+          <a:bodyPr rtlCol="0" anchor="ctr"/>
+          <a:lstStyle/>
+          <a:p>
+            <a:pPr algn="ctr"/>
+            <a:endParaRPr lang="en-GB"/>
+          </a:p>
+        </p:txBody>
+      </p:sp>
+    </p:spTree>
+    <p:extLst>
+      <p:ext uri="{BB962C8B-B14F-4D97-AF65-F5344CB8AC3E}">
+        <p14:creationId xmlns:p14="http://schemas.microsoft.com/office/powerpoint/2010/main" val="1761832435"/>
+      </p:ext>
+    </p:extLst>
+  </p:cSld>
+  <p:clrMapOvr>
+    <a:masterClrMapping/>
+  </p:clrMapOvr>
+  <p:timing>
+    <p:tnLst>
+      <p:par>
+        <p:cTn id="1" dur="indefinite" restart="never" nodeType="tmRoot"/>
+      </p:par>
+    </p:tnLst>
+  </p:timing>
+</p:sld>
+</file>
+
+<file path=ppt/slides/slide19.xml><?xml version="1.0" encoding="utf-8"?>
+<p:sld xmlns:a="http://schemas.openxmlformats.org/drawingml/2006/main" xmlns:r="http://schemas.openxmlformats.org/officeDocument/2006/relationships" xmlns:p="http://schemas.openxmlformats.org/presentationml/2006/main">
+  <p:cSld>
+    <p:spTree>
+      <p:nvGrpSpPr>
+        <p:cNvPr id="1" name=""/>
+        <p:cNvGrpSpPr/>
+        <p:nvPr/>
+      </p:nvGrpSpPr>
+      <p:grpSpPr>
+        <a:xfrm>
+          <a:off x="0" y="0"/>
+          <a:ext cx="0" cy="0"/>
+          <a:chOff x="0" y="0"/>
+          <a:chExt cx="0" cy="0"/>
+        </a:xfrm>
+      </p:grpSpPr>
+      <p:sp>
+        <p:nvSpPr>
+          <p:cNvPr id="2" name="Title 1"/>
+          <p:cNvSpPr>
+            <a:spLocks noGrp="1"/>
+          </p:cNvSpPr>
+          <p:nvPr>
+            <p:ph type="title"/>
+          </p:nvPr>
+        </p:nvSpPr>
+        <p:spPr>
+          <a:xfrm>
+            <a:off x="838200" y="365125"/>
+            <a:ext cx="10515600" cy="768349"/>
+          </a:xfrm>
+        </p:spPr>
+        <p:txBody>
+          <a:bodyPr>
+            <a:normAutofit/>
+          </a:bodyPr>
+          <a:lstStyle/>
+          <a:p>
+            <a:r>
+              <a:rPr lang="en-GB" sz="4000" dirty="0" smtClean="0">
+                <a:solidFill>
+                  <a:schemeClr val="accent1"/>
+                </a:solidFill>
+              </a:rPr>
+              <a:t>Results: Posterior Predictive Distributions</a:t>
+            </a:r>
+            <a:endParaRPr lang="en-GB" sz="4000" dirty="0">
+              <a:solidFill>
+                <a:schemeClr val="accent1"/>
+              </a:solidFill>
+            </a:endParaRPr>
+          </a:p>
+        </p:txBody>
+      </p:sp>
+      <p:sp>
+        <p:nvSpPr>
+          <p:cNvPr id="18" name="AutoShape 2" descr="Image result for epsrc"/>
+          <p:cNvSpPr>
+            <a:spLocks noChangeAspect="1" noChangeArrowheads="1"/>
+          </p:cNvSpPr>
+          <p:nvPr/>
+        </p:nvSpPr>
+        <p:spPr bwMode="auto">
+          <a:xfrm>
+            <a:off x="155575" y="-144463"/>
+            <a:ext cx="304800" cy="304801"/>
+          </a:xfrm>
+          <a:prstGeom prst="rect">
+            <a:avLst/>
+          </a:prstGeom>
+          <a:noFill/>
+          <a:extLst>
+            <a:ext uri="{909E8E84-426E-40DD-AFC4-6F175D3DCCD1}">
+              <a14:hiddenFill xmlns:a14="http://schemas.microsoft.com/office/drawing/2010/main">
+                <a:solidFill>
+                  <a:srgbClr val="FFFFFF"/>
+                </a:solidFill>
+              </a14:hiddenFill>
+            </a:ext>
+          </a:extLst>
+        </p:spPr>
+        <p:txBody>
+          <a:bodyPr vert="horz" wrap="square" lIns="91440" tIns="45720" rIns="91440" bIns="45720" numCol="1" anchor="t" anchorCtr="0" compatLnSpc="1">
+            <a:prstTxWarp prst="textNoShape">
+              <a:avLst/>
+            </a:prstTxWarp>
+          </a:bodyPr>
+          <a:lstStyle/>
+          <a:p>
+            <a:endParaRPr lang="en-GB"/>
+          </a:p>
+        </p:txBody>
+      </p:sp>
+      <p:pic>
+        <p:nvPicPr>
+          <p:cNvPr id="6" name="Picture 5"/>
+          <p:cNvPicPr>
+            <a:picLocks noChangeAspect="1"/>
+          </p:cNvPicPr>
+          <p:nvPr/>
+        </p:nvPicPr>
+        <p:blipFill>
+          <a:blip r:embed="rId2">
+            <a:extLst>
+              <a:ext uri="{28A0092B-C50C-407E-A947-70E740481C1C}">
+                <a14:useLocalDpi xmlns:a14="http://schemas.microsoft.com/office/drawing/2010/main" val="0"/>
+              </a:ext>
+            </a:extLst>
+          </a:blip>
+          <a:stretch>
+            <a:fillRect/>
+          </a:stretch>
+        </p:blipFill>
+        <p:spPr>
+          <a:xfrm>
+            <a:off x="2113547" y="1133474"/>
+            <a:ext cx="7954505" cy="4545431"/>
+          </a:xfrm>
+          <a:prstGeom prst="rect">
+            <a:avLst/>
+          </a:prstGeom>
+        </p:spPr>
+      </p:pic>
+    </p:spTree>
+    <p:extLst>
+      <p:ext uri="{BB962C8B-B14F-4D97-AF65-F5344CB8AC3E}">
+        <p14:creationId xmlns:p14="http://schemas.microsoft.com/office/powerpoint/2010/main" val="21587592"/>
       </p:ext>
     </p:extLst>
   </p:cSld>
@@ -3202,7 +5171,7 @@
       </p:pic>
       <p:pic>
         <p:nvPicPr>
-          <p:cNvPr id="12" name="Picture 11"/>
+          <p:cNvPr id="11" name="Picture 10"/>
           <p:cNvPicPr>
             <a:picLocks noChangeAspect="1"/>
           </p:cNvPicPr>
@@ -3222,8 +5191,8 @@
         </p:blipFill>
         <p:spPr>
           <a:xfrm>
-            <a:off x="1624699" y="2947898"/>
-            <a:ext cx="4183743" cy="1028789"/>
+            <a:off x="7633250" y="2800348"/>
+            <a:ext cx="1581151" cy="1581151"/>
           </a:xfrm>
           <a:prstGeom prst="rect">
             <a:avLst/>
@@ -3232,7 +5201,7 @@
       </p:pic>
       <p:pic>
         <p:nvPicPr>
-          <p:cNvPr id="15" name="Picture 14"/>
+          <p:cNvPr id="12" name="Picture 11"/>
           <p:cNvPicPr>
             <a:picLocks noChangeAspect="1"/>
           </p:cNvPicPr>
@@ -3252,8 +5221,92 @@
         </p:blipFill>
         <p:spPr>
           <a:xfrm>
+            <a:off x="1624699" y="2947898"/>
+            <a:ext cx="4183743" cy="1028789"/>
+          </a:xfrm>
+          <a:prstGeom prst="rect">
+            <a:avLst/>
+          </a:prstGeom>
+        </p:spPr>
+      </p:pic>
+      <p:pic>
+        <p:nvPicPr>
+          <p:cNvPr id="15" name="Picture 14"/>
+          <p:cNvPicPr>
+            <a:picLocks noChangeAspect="1"/>
+          </p:cNvPicPr>
+          <p:nvPr/>
+        </p:nvPicPr>
+        <p:blipFill>
+          <a:blip r:embed="rId5">
+            <a:extLst>
+              <a:ext uri="{28A0092B-C50C-407E-A947-70E740481C1C}">
+                <a14:useLocalDpi xmlns:a14="http://schemas.microsoft.com/office/drawing/2010/main" val="0"/>
+              </a:ext>
+            </a:extLst>
+          </a:blip>
+          <a:stretch>
+            <a:fillRect/>
+          </a:stretch>
+        </p:blipFill>
+        <p:spPr>
+          <a:xfrm>
             <a:off x="3374552" y="4381499"/>
             <a:ext cx="3762375" cy="1219200"/>
+          </a:xfrm>
+          <a:prstGeom prst="rect">
+            <a:avLst/>
+          </a:prstGeom>
+        </p:spPr>
+      </p:pic>
+      <p:pic>
+        <p:nvPicPr>
+          <p:cNvPr id="16" name="Picture 15"/>
+          <p:cNvPicPr>
+            <a:picLocks noChangeAspect="1"/>
+          </p:cNvPicPr>
+          <p:nvPr/>
+        </p:nvPicPr>
+        <p:blipFill>
+          <a:blip r:embed="rId6">
+            <a:extLst>
+              <a:ext uri="{28A0092B-C50C-407E-A947-70E740481C1C}">
+                <a14:useLocalDpi xmlns:a14="http://schemas.microsoft.com/office/drawing/2010/main" val="0"/>
+              </a:ext>
+            </a:extLst>
+          </a:blip>
+          <a:stretch>
+            <a:fillRect/>
+          </a:stretch>
+        </p:blipFill>
+        <p:spPr>
+          <a:xfrm>
+            <a:off x="7633250" y="4424361"/>
+            <a:ext cx="1581151" cy="1581151"/>
+          </a:xfrm>
+          <a:prstGeom prst="rect">
+            <a:avLst/>
+          </a:prstGeom>
+        </p:spPr>
+      </p:pic>
+      <p:pic>
+        <p:nvPicPr>
+          <p:cNvPr id="17" name="Picture 16"/>
+          <p:cNvPicPr>
+            <a:picLocks noChangeAspect="1"/>
+          </p:cNvPicPr>
+          <p:nvPr/>
+        </p:nvPicPr>
+        <p:blipFill>
+          <a:blip r:embed="rId7"/>
+          <a:stretch>
+            <a:fillRect/>
+          </a:stretch>
+        </p:blipFill>
+        <p:spPr>
+          <a:xfrm>
+            <a:off x="7633251" y="1176336"/>
+            <a:ext cx="1581150" cy="1581150"/>
           </a:xfrm>
           <a:prstGeom prst="rect">
             <a:avLst/>
@@ -3308,7 +5361,7 @@
           <p:nvPr/>
         </p:nvPicPr>
         <p:blipFill>
-          <a:blip r:embed="rId5"/>
+          <a:blip r:embed="rId8"/>
           <a:stretch>
             <a:fillRect/>
           </a:stretch>
@@ -3323,10 +5376,630 @@
           </a:prstGeom>
         </p:spPr>
       </p:pic>
+      <p:sp>
+        <p:nvSpPr>
+          <p:cNvPr id="21" name="TextBox 20"/>
+          <p:cNvSpPr txBox="1"/>
+          <p:nvPr/>
+        </p:nvSpPr>
+        <p:spPr>
+          <a:xfrm>
+            <a:off x="9225830" y="1643745"/>
+            <a:ext cx="2462213" cy="646331"/>
+          </a:xfrm>
+          <a:prstGeom prst="rect">
+            <a:avLst/>
+          </a:prstGeom>
+          <a:noFill/>
+        </p:spPr>
+        <p:txBody>
+          <a:bodyPr wrap="none" rtlCol="0">
+            <a:spAutoFit/>
+          </a:bodyPr>
+          <a:lstStyle/>
+          <a:p>
+            <a:r>
+              <a:rPr lang="en-GB" dirty="0" smtClean="0"/>
+              <a:t>Mark </a:t>
+            </a:r>
+            <a:r>
+              <a:rPr lang="en-GB" dirty="0" err="1" smtClean="0"/>
+              <a:t>Girolami</a:t>
+            </a:r>
+            <a:endParaRPr lang="en-GB" dirty="0" smtClean="0"/>
+          </a:p>
+          <a:p>
+            <a:r>
+              <a:rPr lang="en-GB" dirty="0" smtClean="0"/>
+              <a:t>Imperial College London</a:t>
+            </a:r>
+            <a:endParaRPr lang="en-GB" dirty="0"/>
+          </a:p>
+        </p:txBody>
+      </p:sp>
+      <p:sp>
+        <p:nvSpPr>
+          <p:cNvPr id="22" name="TextBox 21"/>
+          <p:cNvSpPr txBox="1"/>
+          <p:nvPr/>
+        </p:nvSpPr>
+        <p:spPr>
+          <a:xfrm>
+            <a:off x="9225830" y="3267757"/>
+            <a:ext cx="2231508" cy="646331"/>
+          </a:xfrm>
+          <a:prstGeom prst="rect">
+            <a:avLst/>
+          </a:prstGeom>
+          <a:noFill/>
+        </p:spPr>
+        <p:txBody>
+          <a:bodyPr wrap="none" rtlCol="0">
+            <a:spAutoFit/>
+          </a:bodyPr>
+          <a:lstStyle/>
+          <a:p>
+            <a:r>
+              <a:rPr lang="en-GB" dirty="0" smtClean="0"/>
+              <a:t>Theo </a:t>
+            </a:r>
+            <a:r>
+              <a:rPr lang="en-GB" dirty="0" err="1" smtClean="0"/>
+              <a:t>Damoulas</a:t>
+            </a:r>
+            <a:endParaRPr lang="en-GB" dirty="0" smtClean="0"/>
+          </a:p>
+          <a:p>
+            <a:r>
+              <a:rPr lang="en-GB" dirty="0" smtClean="0"/>
+              <a:t>University of Warwick</a:t>
+            </a:r>
+            <a:endParaRPr lang="en-GB" dirty="0"/>
+          </a:p>
+        </p:txBody>
+      </p:sp>
+      <p:sp>
+        <p:nvSpPr>
+          <p:cNvPr id="23" name="TextBox 22"/>
+          <p:cNvSpPr txBox="1"/>
+          <p:nvPr/>
+        </p:nvSpPr>
+        <p:spPr>
+          <a:xfrm>
+            <a:off x="9225830" y="4891769"/>
+            <a:ext cx="2625912" cy="646331"/>
+          </a:xfrm>
+          <a:prstGeom prst="rect">
+            <a:avLst/>
+          </a:prstGeom>
+          <a:noFill/>
+        </p:spPr>
+        <p:txBody>
+          <a:bodyPr wrap="none" rtlCol="0">
+            <a:spAutoFit/>
+          </a:bodyPr>
+          <a:lstStyle/>
+          <a:p>
+            <a:r>
+              <a:rPr lang="en-GB" dirty="0" smtClean="0"/>
+              <a:t>Kate Jones</a:t>
+            </a:r>
+          </a:p>
+          <a:p>
+            <a:r>
+              <a:rPr lang="en-GB" dirty="0" smtClean="0"/>
+              <a:t>University College London</a:t>
+            </a:r>
+            <a:endParaRPr lang="en-GB" dirty="0"/>
+          </a:p>
+        </p:txBody>
+      </p:sp>
     </p:spTree>
     <p:extLst>
       <p:ext uri="{BB962C8B-B14F-4D97-AF65-F5344CB8AC3E}">
-        <p14:creationId xmlns:p14="http://schemas.microsoft.com/office/powerpoint/2010/main" val="2899024980"/>
+        <p14:creationId xmlns:p14="http://schemas.microsoft.com/office/powerpoint/2010/main" val="918551748"/>
+      </p:ext>
+    </p:extLst>
+  </p:cSld>
+  <p:clrMapOvr>
+    <a:masterClrMapping/>
+  </p:clrMapOvr>
+  <p:timing>
+    <p:tnLst>
+      <p:par>
+        <p:cTn id="1" dur="indefinite" restart="never" nodeType="tmRoot"/>
+      </p:par>
+    </p:tnLst>
+  </p:timing>
+</p:sld>
+</file>
+
+<file path=ppt/slides/slide20.xml><?xml version="1.0" encoding="utf-8"?>
+<p:sld xmlns:a="http://schemas.openxmlformats.org/drawingml/2006/main" xmlns:r="http://schemas.openxmlformats.org/officeDocument/2006/relationships" xmlns:p="http://schemas.openxmlformats.org/presentationml/2006/main">
+  <p:cSld>
+    <p:spTree>
+      <p:nvGrpSpPr>
+        <p:cNvPr id="1" name=""/>
+        <p:cNvGrpSpPr/>
+        <p:nvPr/>
+      </p:nvGrpSpPr>
+      <p:grpSpPr>
+        <a:xfrm>
+          <a:off x="0" y="0"/>
+          <a:ext cx="0" cy="0"/>
+          <a:chOff x="0" y="0"/>
+          <a:chExt cx="0" cy="0"/>
+        </a:xfrm>
+      </p:grpSpPr>
+      <p:sp>
+        <p:nvSpPr>
+          <p:cNvPr id="2" name="Title 1"/>
+          <p:cNvSpPr>
+            <a:spLocks noGrp="1"/>
+          </p:cNvSpPr>
+          <p:nvPr>
+            <p:ph type="title"/>
+          </p:nvPr>
+        </p:nvSpPr>
+        <p:spPr>
+          <a:xfrm>
+            <a:off x="838200" y="365125"/>
+            <a:ext cx="10515600" cy="768349"/>
+          </a:xfrm>
+        </p:spPr>
+        <p:txBody>
+          <a:bodyPr>
+            <a:normAutofit/>
+          </a:bodyPr>
+          <a:lstStyle/>
+          <a:p>
+            <a:r>
+              <a:rPr lang="en-GB" sz="4000" dirty="0" smtClean="0">
+                <a:solidFill>
+                  <a:schemeClr val="accent1"/>
+                </a:solidFill>
+              </a:rPr>
+              <a:t>Conclusions</a:t>
+            </a:r>
+            <a:endParaRPr lang="en-GB" sz="4000" dirty="0">
+              <a:solidFill>
+                <a:schemeClr val="accent1"/>
+              </a:solidFill>
+            </a:endParaRPr>
+          </a:p>
+        </p:txBody>
+      </p:sp>
+      <p:sp>
+        <p:nvSpPr>
+          <p:cNvPr id="18" name="AutoShape 2" descr="Image result for epsrc"/>
+          <p:cNvSpPr>
+            <a:spLocks noChangeAspect="1" noChangeArrowheads="1"/>
+          </p:cNvSpPr>
+          <p:nvPr/>
+        </p:nvSpPr>
+        <p:spPr bwMode="auto">
+          <a:xfrm>
+            <a:off x="155575" y="-144463"/>
+            <a:ext cx="304800" cy="304801"/>
+          </a:xfrm>
+          <a:prstGeom prst="rect">
+            <a:avLst/>
+          </a:prstGeom>
+          <a:noFill/>
+          <a:extLst>
+            <a:ext uri="{909E8E84-426E-40DD-AFC4-6F175D3DCCD1}">
+              <a14:hiddenFill xmlns:a14="http://schemas.microsoft.com/office/drawing/2010/main">
+                <a:solidFill>
+                  <a:srgbClr val="FFFFFF"/>
+                </a:solidFill>
+              </a14:hiddenFill>
+            </a:ext>
+          </a:extLst>
+        </p:spPr>
+        <p:txBody>
+          <a:bodyPr vert="horz" wrap="square" lIns="91440" tIns="45720" rIns="91440" bIns="45720" numCol="1" anchor="t" anchorCtr="0" compatLnSpc="1">
+            <a:prstTxWarp prst="textNoShape">
+              <a:avLst/>
+            </a:prstTxWarp>
+          </a:bodyPr>
+          <a:lstStyle/>
+          <a:p>
+            <a:endParaRPr lang="en-GB"/>
+          </a:p>
+        </p:txBody>
+      </p:sp>
+      <p:sp>
+        <p:nvSpPr>
+          <p:cNvPr id="6" name="TextBox 5"/>
+          <p:cNvSpPr txBox="1"/>
+          <p:nvPr/>
+        </p:nvSpPr>
+        <p:spPr>
+          <a:xfrm>
+            <a:off x="838200" y="1684419"/>
+            <a:ext cx="10515600" cy="1354217"/>
+          </a:xfrm>
+          <a:prstGeom prst="rect">
+            <a:avLst/>
+          </a:prstGeom>
+          <a:noFill/>
+        </p:spPr>
+        <p:txBody>
+          <a:bodyPr wrap="square" rtlCol="0">
+            <a:spAutoFit/>
+          </a:bodyPr>
+          <a:lstStyle/>
+          <a:p>
+            <a:pPr marL="285750" indent="-285750">
+              <a:buFont typeface="Arial" panose="020B0604020202020204" pitchFamily="34" charset="0"/>
+              <a:buChar char="•"/>
+            </a:pPr>
+            <a:r>
+              <a:rPr lang="en-GB" sz="3200" dirty="0" smtClean="0">
+                <a:latin typeface="Times New Roman" panose="02020603050405020304" pitchFamily="18" charset="0"/>
+                <a:cs typeface="Times New Roman" panose="02020603050405020304" pitchFamily="18" charset="0"/>
+              </a:rPr>
+              <a:t>Phylogenetic Signal Identified</a:t>
+            </a:r>
+          </a:p>
+          <a:p>
+            <a:pPr marL="285750" indent="-285750">
+              <a:buFont typeface="Arial" panose="020B0604020202020204" pitchFamily="34" charset="0"/>
+              <a:buChar char="•"/>
+            </a:pPr>
+            <a:r>
+              <a:rPr lang="en-GB" sz="3200" dirty="0" smtClean="0">
+                <a:latin typeface="Times New Roman" panose="02020603050405020304" pitchFamily="18" charset="0"/>
+                <a:cs typeface="Times New Roman" panose="02020603050405020304" pitchFamily="18" charset="0"/>
+              </a:rPr>
+              <a:t>Strong Phylogenetic signal at low frequencies</a:t>
+            </a:r>
+            <a:r>
+              <a:rPr lang="en-GB" dirty="0" smtClean="0"/>
+              <a:t>.</a:t>
+            </a:r>
+          </a:p>
+          <a:p>
+            <a:endParaRPr lang="en-GB" dirty="0"/>
+          </a:p>
+        </p:txBody>
+      </p:sp>
+    </p:spTree>
+    <p:extLst>
+      <p:ext uri="{BB962C8B-B14F-4D97-AF65-F5344CB8AC3E}">
+        <p14:creationId xmlns:p14="http://schemas.microsoft.com/office/powerpoint/2010/main" val="1070331795"/>
+      </p:ext>
+    </p:extLst>
+  </p:cSld>
+  <p:clrMapOvr>
+    <a:masterClrMapping/>
+  </p:clrMapOvr>
+  <p:timing>
+    <p:tnLst>
+      <p:par>
+        <p:cTn id="1" dur="indefinite" restart="never" nodeType="tmRoot"/>
+      </p:par>
+    </p:tnLst>
+  </p:timing>
+</p:sld>
+</file>
+
+<file path=ppt/slides/slide21.xml><?xml version="1.0" encoding="utf-8"?>
+<p:sld xmlns:a="http://schemas.openxmlformats.org/drawingml/2006/main" xmlns:r="http://schemas.openxmlformats.org/officeDocument/2006/relationships" xmlns:p="http://schemas.openxmlformats.org/presentationml/2006/main">
+  <p:cSld>
+    <p:spTree>
+      <p:nvGrpSpPr>
+        <p:cNvPr id="1" name=""/>
+        <p:cNvGrpSpPr/>
+        <p:nvPr/>
+      </p:nvGrpSpPr>
+      <p:grpSpPr>
+        <a:xfrm>
+          <a:off x="0" y="0"/>
+          <a:ext cx="0" cy="0"/>
+          <a:chOff x="0" y="0"/>
+          <a:chExt cx="0" cy="0"/>
+        </a:xfrm>
+      </p:grpSpPr>
+      <p:sp>
+        <p:nvSpPr>
+          <p:cNvPr id="2" name="Title 1"/>
+          <p:cNvSpPr>
+            <a:spLocks noGrp="1"/>
+          </p:cNvSpPr>
+          <p:nvPr>
+            <p:ph type="title"/>
+          </p:nvPr>
+        </p:nvSpPr>
+        <p:spPr>
+          <a:xfrm>
+            <a:off x="838200" y="365125"/>
+            <a:ext cx="10515600" cy="768349"/>
+          </a:xfrm>
+        </p:spPr>
+        <p:txBody>
+          <a:bodyPr>
+            <a:normAutofit/>
+          </a:bodyPr>
+          <a:lstStyle/>
+          <a:p>
+            <a:r>
+              <a:rPr lang="en-GB" sz="4000" dirty="0" smtClean="0">
+                <a:solidFill>
+                  <a:schemeClr val="accent1"/>
+                </a:solidFill>
+              </a:rPr>
+              <a:t>Future Work</a:t>
+            </a:r>
+            <a:endParaRPr lang="en-GB" sz="4000" dirty="0">
+              <a:solidFill>
+                <a:schemeClr val="accent1"/>
+              </a:solidFill>
+            </a:endParaRPr>
+          </a:p>
+        </p:txBody>
+      </p:sp>
+      <p:sp>
+        <p:nvSpPr>
+          <p:cNvPr id="18" name="AutoShape 2" descr="Image result for epsrc"/>
+          <p:cNvSpPr>
+            <a:spLocks noChangeAspect="1" noChangeArrowheads="1"/>
+          </p:cNvSpPr>
+          <p:nvPr/>
+        </p:nvSpPr>
+        <p:spPr bwMode="auto">
+          <a:xfrm>
+            <a:off x="155575" y="-144463"/>
+            <a:ext cx="304800" cy="304801"/>
+          </a:xfrm>
+          <a:prstGeom prst="rect">
+            <a:avLst/>
+          </a:prstGeom>
+          <a:noFill/>
+          <a:extLst>
+            <a:ext uri="{909E8E84-426E-40DD-AFC4-6F175D3DCCD1}">
+              <a14:hiddenFill xmlns:a14="http://schemas.microsoft.com/office/drawing/2010/main">
+                <a:solidFill>
+                  <a:srgbClr val="FFFFFF"/>
+                </a:solidFill>
+              </a14:hiddenFill>
+            </a:ext>
+          </a:extLst>
+        </p:spPr>
+        <p:txBody>
+          <a:bodyPr vert="horz" wrap="square" lIns="91440" tIns="45720" rIns="91440" bIns="45720" numCol="1" anchor="t" anchorCtr="0" compatLnSpc="1">
+            <a:prstTxWarp prst="textNoShape">
+              <a:avLst/>
+            </a:prstTxWarp>
+          </a:bodyPr>
+          <a:lstStyle/>
+          <a:p>
+            <a:endParaRPr lang="en-GB"/>
+          </a:p>
+        </p:txBody>
+      </p:sp>
+      <p:graphicFrame>
+        <p:nvGraphicFramePr>
+          <p:cNvPr id="7" name="Object 6"/>
+          <p:cNvGraphicFramePr>
+            <a:graphicFrameLocks noChangeAspect="1"/>
+          </p:cNvGraphicFramePr>
+          <p:nvPr>
+            <p:extLst>
+              <p:ext uri="{D42A27DB-BD31-4B8C-83A1-F6EECF244321}">
+                <p14:modId xmlns:p14="http://schemas.microsoft.com/office/powerpoint/2010/main" val="755906176"/>
+              </p:ext>
+            </p:extLst>
+          </p:nvPr>
+        </p:nvGraphicFramePr>
+        <p:xfrm>
+          <a:off x="6553200" y="1133474"/>
+          <a:ext cx="4800600" cy="4800600"/>
+        </p:xfrm>
+        <a:graphic>
+          <a:graphicData uri="http://schemas.openxmlformats.org/presentationml/2006/ole">
+            <mc:AlternateContent xmlns:mc="http://schemas.openxmlformats.org/markup-compatibility/2006">
+              <mc:Choice xmlns:v="urn:schemas-microsoft-com:vml" Requires="v">
+                <p:oleObj spid="_x0000_s5127" name="Acrobat Document" r:id="rId3" imgW="4800532" imgH="4800600" progId="AcroExch.Document.DC">
+                  <p:embed/>
+                </p:oleObj>
+              </mc:Choice>
+              <mc:Fallback>
+                <p:oleObj name="Acrobat Document" r:id="rId3" imgW="4800532" imgH="4800600" progId="AcroExch.Document.DC">
+                  <p:embed/>
+                  <p:pic>
+                    <p:nvPicPr>
+                      <p:cNvPr id="0" name=""/>
+                      <p:cNvPicPr/>
+                      <p:nvPr/>
+                    </p:nvPicPr>
+                    <p:blipFill>
+                      <a:blip r:embed="rId4"/>
+                      <a:stretch>
+                        <a:fillRect/>
+                      </a:stretch>
+                    </p:blipFill>
+                    <p:spPr>
+                      <a:xfrm>
+                        <a:off x="6553200" y="1133474"/>
+                        <a:ext cx="4800600" cy="4800600"/>
+                      </a:xfrm>
+                      <a:prstGeom prst="rect">
+                        <a:avLst/>
+                      </a:prstGeom>
+                    </p:spPr>
+                  </p:pic>
+                </p:oleObj>
+              </mc:Fallback>
+            </mc:AlternateContent>
+          </a:graphicData>
+        </a:graphic>
+      </p:graphicFrame>
+      <p:sp>
+        <p:nvSpPr>
+          <p:cNvPr id="8" name="TextBox 7"/>
+          <p:cNvSpPr txBox="1"/>
+          <p:nvPr/>
+        </p:nvSpPr>
+        <p:spPr>
+          <a:xfrm>
+            <a:off x="838200" y="1271616"/>
+            <a:ext cx="5715000" cy="4524315"/>
+          </a:xfrm>
+          <a:prstGeom prst="rect">
+            <a:avLst/>
+          </a:prstGeom>
+          <a:noFill/>
+        </p:spPr>
+        <p:txBody>
+          <a:bodyPr wrap="square" rtlCol="0">
+            <a:spAutoFit/>
+          </a:bodyPr>
+          <a:lstStyle/>
+          <a:p>
+            <a:pPr marL="285750" indent="-285750">
+              <a:buFont typeface="Arial" panose="020B0604020202020204" pitchFamily="34" charset="0"/>
+              <a:buChar char="•"/>
+            </a:pPr>
+            <a:r>
+              <a:rPr lang="en-GB" sz="3200" dirty="0" smtClean="0">
+                <a:latin typeface="Times New Roman" panose="02020603050405020304" pitchFamily="18" charset="0"/>
+                <a:cs typeface="Times New Roman" panose="02020603050405020304" pitchFamily="18" charset="0"/>
+              </a:rPr>
+              <a:t>Implement the Phylogenetic Gaussian Process Regression Model for Echolocation Call Spectrograms.</a:t>
+            </a:r>
+          </a:p>
+          <a:p>
+            <a:pPr marL="285750" indent="-285750">
+              <a:buFont typeface="Arial" panose="020B0604020202020204" pitchFamily="34" charset="0"/>
+              <a:buChar char="•"/>
+            </a:pPr>
+            <a:r>
+              <a:rPr lang="en-GB" sz="3200" dirty="0" smtClean="0">
+                <a:latin typeface="Times New Roman" panose="02020603050405020304" pitchFamily="18" charset="0"/>
+                <a:cs typeface="Times New Roman" panose="02020603050405020304" pitchFamily="18" charset="0"/>
+              </a:rPr>
+              <a:t>Consider Alternative Echolocation Call Representations.</a:t>
+            </a:r>
+          </a:p>
+          <a:p>
+            <a:pPr marL="285750" indent="-285750">
+              <a:buFont typeface="Arial" panose="020B0604020202020204" pitchFamily="34" charset="0"/>
+              <a:buChar char="•"/>
+            </a:pPr>
+            <a:r>
+              <a:rPr lang="en-GB" sz="3200" dirty="0" smtClean="0">
+                <a:latin typeface="Times New Roman" panose="02020603050405020304" pitchFamily="18" charset="0"/>
+                <a:cs typeface="Times New Roman" panose="02020603050405020304" pitchFamily="18" charset="0"/>
+              </a:rPr>
+              <a:t>Consider Alternative models for the evolutionary dynamics.</a:t>
+            </a:r>
+            <a:endParaRPr lang="en-GB" sz="3200" dirty="0">
+              <a:latin typeface="Times New Roman" panose="02020603050405020304" pitchFamily="18" charset="0"/>
+              <a:cs typeface="Times New Roman" panose="02020603050405020304" pitchFamily="18" charset="0"/>
+            </a:endParaRPr>
+          </a:p>
+        </p:txBody>
+      </p:sp>
+    </p:spTree>
+    <p:extLst>
+      <p:ext uri="{BB962C8B-B14F-4D97-AF65-F5344CB8AC3E}">
+        <p14:creationId xmlns:p14="http://schemas.microsoft.com/office/powerpoint/2010/main" val="3819646397"/>
+      </p:ext>
+    </p:extLst>
+  </p:cSld>
+  <p:clrMapOvr>
+    <a:masterClrMapping/>
+  </p:clrMapOvr>
+  <p:timing>
+    <p:tnLst>
+      <p:par>
+        <p:cTn id="1" dur="indefinite" restart="never" nodeType="tmRoot"/>
+      </p:par>
+    </p:tnLst>
+  </p:timing>
+</p:sld>
+</file>
+
+<file path=ppt/slides/slide22.xml><?xml version="1.0" encoding="utf-8"?>
+<p:sld xmlns:a="http://schemas.openxmlformats.org/drawingml/2006/main" xmlns:r="http://schemas.openxmlformats.org/officeDocument/2006/relationships" xmlns:p="http://schemas.openxmlformats.org/presentationml/2006/main">
+  <p:cSld>
+    <p:spTree>
+      <p:nvGrpSpPr>
+        <p:cNvPr id="1" name=""/>
+        <p:cNvGrpSpPr/>
+        <p:nvPr/>
+      </p:nvGrpSpPr>
+      <p:grpSpPr>
+        <a:xfrm>
+          <a:off x="0" y="0"/>
+          <a:ext cx="0" cy="0"/>
+          <a:chOff x="0" y="0"/>
+          <a:chExt cx="0" cy="0"/>
+        </a:xfrm>
+      </p:grpSpPr>
+      <p:sp>
+        <p:nvSpPr>
+          <p:cNvPr id="18" name="AutoShape 2" descr="Image result for epsrc"/>
+          <p:cNvSpPr>
+            <a:spLocks noChangeAspect="1" noChangeArrowheads="1"/>
+          </p:cNvSpPr>
+          <p:nvPr/>
+        </p:nvSpPr>
+        <p:spPr bwMode="auto">
+          <a:xfrm>
+            <a:off x="155575" y="-144463"/>
+            <a:ext cx="304800" cy="304801"/>
+          </a:xfrm>
+          <a:prstGeom prst="rect">
+            <a:avLst/>
+          </a:prstGeom>
+          <a:noFill/>
+          <a:extLst>
+            <a:ext uri="{909E8E84-426E-40DD-AFC4-6F175D3DCCD1}">
+              <a14:hiddenFill xmlns:a14="http://schemas.microsoft.com/office/drawing/2010/main">
+                <a:solidFill>
+                  <a:srgbClr val="FFFFFF"/>
+                </a:solidFill>
+              </a14:hiddenFill>
+            </a:ext>
+          </a:extLst>
+        </p:spPr>
+        <p:txBody>
+          <a:bodyPr vert="horz" wrap="square" lIns="91440" tIns="45720" rIns="91440" bIns="45720" numCol="1" anchor="t" anchorCtr="0" compatLnSpc="1">
+            <a:prstTxWarp prst="textNoShape">
+              <a:avLst/>
+            </a:prstTxWarp>
+          </a:bodyPr>
+          <a:lstStyle/>
+          <a:p>
+            <a:endParaRPr lang="en-GB"/>
+          </a:p>
+        </p:txBody>
+      </p:sp>
+      <p:sp>
+        <p:nvSpPr>
+          <p:cNvPr id="3" name="Title 2"/>
+          <p:cNvSpPr>
+            <a:spLocks noGrp="1"/>
+          </p:cNvSpPr>
+          <p:nvPr>
+            <p:ph type="title"/>
+          </p:nvPr>
+        </p:nvSpPr>
+        <p:spPr/>
+        <p:txBody>
+          <a:bodyPr/>
+          <a:lstStyle/>
+          <a:p>
+            <a:endParaRPr lang="en-GB"/>
+          </a:p>
+        </p:txBody>
+      </p:sp>
+    </p:spTree>
+    <p:extLst>
+      <p:ext uri="{BB962C8B-B14F-4D97-AF65-F5344CB8AC3E}">
+        <p14:creationId xmlns:p14="http://schemas.microsoft.com/office/powerpoint/2010/main" val="3985188853"/>
       </p:ext>
     </p:extLst>
   </p:cSld>
@@ -3388,7 +6061,7 @@
                   <a:schemeClr val="accent1"/>
                 </a:solidFill>
               </a:rPr>
-              <a:t>Acknowledgements</a:t>
+              <a:t>Bats: Some Background</a:t>
             </a:r>
             <a:endParaRPr lang="en-GB" sz="4000" dirty="0">
               <a:solidFill>
@@ -3398,9 +6071,48 @@
           </a:p>
         </p:txBody>
       </p:sp>
+      <p:sp>
+        <p:nvSpPr>
+          <p:cNvPr id="18" name="AutoShape 2" descr="Image result for epsrc"/>
+          <p:cNvSpPr>
+            <a:spLocks noChangeAspect="1" noChangeArrowheads="1"/>
+          </p:cNvSpPr>
+          <p:nvPr/>
+        </p:nvSpPr>
+        <p:spPr bwMode="auto">
+          <a:xfrm>
+            <a:off x="155575" y="-144463"/>
+            <a:ext cx="304800" cy="304801"/>
+          </a:xfrm>
+          <a:prstGeom prst="rect">
+            <a:avLst/>
+          </a:prstGeom>
+          <a:noFill/>
+          <a:extLst>
+            <a:ext uri="{909E8E84-426E-40DD-AFC4-6F175D3DCCD1}">
+              <a14:hiddenFill xmlns:a14="http://schemas.microsoft.com/office/drawing/2010/main">
+                <a:solidFill>
+                  <a:srgbClr val="FFFFFF"/>
+                </a:solidFill>
+              </a14:hiddenFill>
+            </a:ext>
+          </a:extLst>
+        </p:spPr>
+        <p:txBody>
+          <a:bodyPr vert="horz" wrap="square" lIns="91440" tIns="45720" rIns="91440" bIns="45720" numCol="1" anchor="t" anchorCtr="0" compatLnSpc="1">
+            <a:prstTxWarp prst="textNoShape">
+              <a:avLst/>
+            </a:prstTxWarp>
+          </a:bodyPr>
+          <a:lstStyle/>
+          <a:p>
+            <a:endParaRPr lang="en-GB"/>
+          </a:p>
+        </p:txBody>
+      </p:sp>
       <p:pic>
         <p:nvPicPr>
-          <p:cNvPr id="10" name="Picture 9"/>
+          <p:cNvPr id="6" name="Picture 5"/>
           <p:cNvPicPr>
             <a:picLocks noChangeAspect="1"/>
           </p:cNvPicPr>
@@ -3420,343 +6132,18 @@
         </p:blipFill>
         <p:spPr>
           <a:xfrm>
-            <a:off x="620804" y="3976687"/>
-            <a:ext cx="2257425" cy="2028825"/>
+            <a:off x="2699192" y="1591383"/>
+            <a:ext cx="6793616" cy="3675235"/>
           </a:xfrm>
           <a:prstGeom prst="rect">
             <a:avLst/>
           </a:prstGeom>
         </p:spPr>
       </p:pic>
-      <p:pic>
-        <p:nvPicPr>
-          <p:cNvPr id="11" name="Picture 10"/>
-          <p:cNvPicPr>
-            <a:picLocks noChangeAspect="1"/>
-          </p:cNvPicPr>
-          <p:nvPr/>
-        </p:nvPicPr>
-        <p:blipFill>
-          <a:blip r:embed="rId3">
-            <a:extLst>
-              <a:ext uri="{28A0092B-C50C-407E-A947-70E740481C1C}">
-                <a14:useLocalDpi xmlns:a14="http://schemas.microsoft.com/office/drawing/2010/main" val="0"/>
-              </a:ext>
-            </a:extLst>
-          </a:blip>
-          <a:stretch>
-            <a:fillRect/>
-          </a:stretch>
-        </p:blipFill>
-        <p:spPr>
-          <a:xfrm>
-            <a:off x="7633250" y="2800348"/>
-            <a:ext cx="1581151" cy="1581151"/>
-          </a:xfrm>
-          <a:prstGeom prst="rect">
-            <a:avLst/>
-          </a:prstGeom>
-        </p:spPr>
-      </p:pic>
-      <p:pic>
-        <p:nvPicPr>
-          <p:cNvPr id="12" name="Picture 11"/>
-          <p:cNvPicPr>
-            <a:picLocks noChangeAspect="1"/>
-          </p:cNvPicPr>
-          <p:nvPr/>
-        </p:nvPicPr>
-        <p:blipFill>
-          <a:blip r:embed="rId4">
-            <a:extLst>
-              <a:ext uri="{28A0092B-C50C-407E-A947-70E740481C1C}">
-                <a14:useLocalDpi xmlns:a14="http://schemas.microsoft.com/office/drawing/2010/main" val="0"/>
-              </a:ext>
-            </a:extLst>
-          </a:blip>
-          <a:stretch>
-            <a:fillRect/>
-          </a:stretch>
-        </p:blipFill>
-        <p:spPr>
-          <a:xfrm>
-            <a:off x="1624699" y="2947898"/>
-            <a:ext cx="4183743" cy="1028789"/>
-          </a:xfrm>
-          <a:prstGeom prst="rect">
-            <a:avLst/>
-          </a:prstGeom>
-        </p:spPr>
-      </p:pic>
-      <p:pic>
-        <p:nvPicPr>
-          <p:cNvPr id="15" name="Picture 14"/>
-          <p:cNvPicPr>
-            <a:picLocks noChangeAspect="1"/>
-          </p:cNvPicPr>
-          <p:nvPr/>
-        </p:nvPicPr>
-        <p:blipFill>
-          <a:blip r:embed="rId5">
-            <a:extLst>
-              <a:ext uri="{28A0092B-C50C-407E-A947-70E740481C1C}">
-                <a14:useLocalDpi xmlns:a14="http://schemas.microsoft.com/office/drawing/2010/main" val="0"/>
-              </a:ext>
-            </a:extLst>
-          </a:blip>
-          <a:stretch>
-            <a:fillRect/>
-          </a:stretch>
-        </p:blipFill>
-        <p:spPr>
-          <a:xfrm>
-            <a:off x="3374552" y="4381499"/>
-            <a:ext cx="3762375" cy="1219200"/>
-          </a:xfrm>
-          <a:prstGeom prst="rect">
-            <a:avLst/>
-          </a:prstGeom>
-        </p:spPr>
-      </p:pic>
-      <p:pic>
-        <p:nvPicPr>
-          <p:cNvPr id="16" name="Picture 15"/>
-          <p:cNvPicPr>
-            <a:picLocks noChangeAspect="1"/>
-          </p:cNvPicPr>
-          <p:nvPr/>
-        </p:nvPicPr>
-        <p:blipFill>
-          <a:blip r:embed="rId6">
-            <a:extLst>
-              <a:ext uri="{28A0092B-C50C-407E-A947-70E740481C1C}">
-                <a14:useLocalDpi xmlns:a14="http://schemas.microsoft.com/office/drawing/2010/main" val="0"/>
-              </a:ext>
-            </a:extLst>
-          </a:blip>
-          <a:stretch>
-            <a:fillRect/>
-          </a:stretch>
-        </p:blipFill>
-        <p:spPr>
-          <a:xfrm>
-            <a:off x="7633250" y="4424361"/>
-            <a:ext cx="1581151" cy="1581151"/>
-          </a:xfrm>
-          <a:prstGeom prst="rect">
-            <a:avLst/>
-          </a:prstGeom>
-        </p:spPr>
-      </p:pic>
-      <p:pic>
-        <p:nvPicPr>
-          <p:cNvPr id="17" name="Picture 16"/>
-          <p:cNvPicPr>
-            <a:picLocks noChangeAspect="1"/>
-          </p:cNvPicPr>
-          <p:nvPr/>
-        </p:nvPicPr>
-        <p:blipFill>
-          <a:blip r:embed="rId7"/>
-          <a:stretch>
-            <a:fillRect/>
-          </a:stretch>
-        </p:blipFill>
-        <p:spPr>
-          <a:xfrm>
-            <a:off x="7633251" y="1176336"/>
-            <a:ext cx="1581150" cy="1581150"/>
-          </a:xfrm>
-          <a:prstGeom prst="rect">
-            <a:avLst/>
-          </a:prstGeom>
-        </p:spPr>
-      </p:pic>
-      <p:sp>
-        <p:nvSpPr>
-          <p:cNvPr id="18" name="AutoShape 2" descr="Image result for epsrc"/>
-          <p:cNvSpPr>
-            <a:spLocks noChangeAspect="1" noChangeArrowheads="1"/>
-          </p:cNvSpPr>
-          <p:nvPr/>
-        </p:nvSpPr>
-        <p:spPr bwMode="auto">
-          <a:xfrm>
-            <a:off x="155575" y="-144463"/>
-            <a:ext cx="304800" cy="304801"/>
-          </a:xfrm>
-          <a:prstGeom prst="rect">
-            <a:avLst/>
-          </a:prstGeom>
-          <a:noFill/>
-          <a:extLst>
-            <a:ext uri="{909E8E84-426E-40DD-AFC4-6F175D3DCCD1}">
-              <a14:hiddenFill xmlns:a14="http://schemas.microsoft.com/office/drawing/2010/main">
-                <a:solidFill>
-                  <a:srgbClr val="FFFFFF"/>
-                </a:solidFill>
-              </a14:hiddenFill>
-            </a:ext>
-          </a:extLst>
-        </p:spPr>
-        <p:txBody>
-          <a:bodyPr vert="horz" wrap="square" lIns="91440" tIns="45720" rIns="91440" bIns="45720" numCol="1" anchor="t" anchorCtr="0" compatLnSpc="1">
-            <a:prstTxWarp prst="textNoShape">
-              <a:avLst/>
-            </a:prstTxWarp>
-          </a:bodyPr>
-          <a:lstStyle/>
-          <a:p>
-            <a:endParaRPr lang="en-GB"/>
-          </a:p>
-        </p:txBody>
-      </p:sp>
-      <p:pic>
-        <p:nvPicPr>
-          <p:cNvPr id="20" name="Picture 19"/>
-          <p:cNvPicPr>
-            <a:picLocks noChangeAspect="1"/>
-          </p:cNvPicPr>
-          <p:nvPr/>
-        </p:nvPicPr>
-        <p:blipFill>
-          <a:blip r:embed="rId8"/>
-          <a:stretch>
-            <a:fillRect/>
-          </a:stretch>
-        </p:blipFill>
-        <p:spPr>
-          <a:xfrm>
-            <a:off x="2273534" y="1366748"/>
-            <a:ext cx="2886075" cy="1581150"/>
-          </a:xfrm>
-          <a:prstGeom prst="rect">
-            <a:avLst/>
-          </a:prstGeom>
-        </p:spPr>
-      </p:pic>
-      <p:sp>
-        <p:nvSpPr>
-          <p:cNvPr id="21" name="TextBox 20"/>
-          <p:cNvSpPr txBox="1"/>
-          <p:nvPr/>
-        </p:nvSpPr>
-        <p:spPr>
-          <a:xfrm>
-            <a:off x="9225830" y="1643745"/>
-            <a:ext cx="2462213" cy="646331"/>
-          </a:xfrm>
-          <a:prstGeom prst="rect">
-            <a:avLst/>
-          </a:prstGeom>
-          <a:noFill/>
-        </p:spPr>
-        <p:txBody>
-          <a:bodyPr wrap="none" rtlCol="0">
-            <a:spAutoFit/>
-          </a:bodyPr>
-          <a:lstStyle/>
-          <a:p>
-            <a:r>
-              <a:rPr lang="en-GB" dirty="0" smtClean="0"/>
-              <a:t>Mark </a:t>
-            </a:r>
-            <a:r>
-              <a:rPr lang="en-GB" dirty="0" err="1" smtClean="0"/>
-              <a:t>Girolami</a:t>
-            </a:r>
-            <a:endParaRPr lang="en-GB" dirty="0" smtClean="0"/>
-          </a:p>
-          <a:p>
-            <a:r>
-              <a:rPr lang="en-GB" dirty="0" smtClean="0"/>
-              <a:t>Imperial College London</a:t>
-            </a:r>
-            <a:endParaRPr lang="en-GB" dirty="0"/>
-          </a:p>
-        </p:txBody>
-      </p:sp>
-      <p:sp>
-        <p:nvSpPr>
-          <p:cNvPr id="22" name="TextBox 21"/>
-          <p:cNvSpPr txBox="1"/>
-          <p:nvPr/>
-        </p:nvSpPr>
-        <p:spPr>
-          <a:xfrm>
-            <a:off x="9225830" y="3267757"/>
-            <a:ext cx="2231508" cy="646331"/>
-          </a:xfrm>
-          <a:prstGeom prst="rect">
-            <a:avLst/>
-          </a:prstGeom>
-          <a:noFill/>
-        </p:spPr>
-        <p:txBody>
-          <a:bodyPr wrap="none" rtlCol="0">
-            <a:spAutoFit/>
-          </a:bodyPr>
-          <a:lstStyle/>
-          <a:p>
-            <a:r>
-              <a:rPr lang="en-GB" dirty="0" smtClean="0"/>
-              <a:t>Theo </a:t>
-            </a:r>
-            <a:r>
-              <a:rPr lang="en-GB" dirty="0" err="1" smtClean="0"/>
-              <a:t>Damoulas</a:t>
-            </a:r>
-            <a:endParaRPr lang="en-GB" dirty="0" smtClean="0"/>
-          </a:p>
-          <a:p>
-            <a:r>
-              <a:rPr lang="en-GB" dirty="0" smtClean="0"/>
-              <a:t>University of Warwick</a:t>
-            </a:r>
-            <a:endParaRPr lang="en-GB" dirty="0"/>
-          </a:p>
-        </p:txBody>
-      </p:sp>
-      <p:sp>
-        <p:nvSpPr>
-          <p:cNvPr id="23" name="TextBox 22"/>
-          <p:cNvSpPr txBox="1"/>
-          <p:nvPr/>
-        </p:nvSpPr>
-        <p:spPr>
-          <a:xfrm>
-            <a:off x="9225830" y="4891769"/>
-            <a:ext cx="2625912" cy="646331"/>
-          </a:xfrm>
-          <a:prstGeom prst="rect">
-            <a:avLst/>
-          </a:prstGeom>
-          <a:noFill/>
-        </p:spPr>
-        <p:txBody>
-          <a:bodyPr wrap="none" rtlCol="0">
-            <a:spAutoFit/>
-          </a:bodyPr>
-          <a:lstStyle/>
-          <a:p>
-            <a:r>
-              <a:rPr lang="en-GB" dirty="0" smtClean="0"/>
-              <a:t>Kate Jones</a:t>
-            </a:r>
-          </a:p>
-          <a:p>
-            <a:r>
-              <a:rPr lang="en-GB" dirty="0" smtClean="0"/>
-              <a:t>University College London</a:t>
-            </a:r>
-            <a:endParaRPr lang="en-GB" dirty="0"/>
-          </a:p>
-        </p:txBody>
-      </p:sp>
     </p:spTree>
     <p:extLst>
       <p:ext uri="{BB962C8B-B14F-4D97-AF65-F5344CB8AC3E}">
-        <p14:creationId xmlns:p14="http://schemas.microsoft.com/office/powerpoint/2010/main" val="918551748"/>
+        <p14:creationId xmlns:p14="http://schemas.microsoft.com/office/powerpoint/2010/main" val="1794890671"/>
       </p:ext>
     </p:extLst>
   </p:cSld>
@@ -3808,7 +6195,7 @@
         </p:spPr>
         <p:txBody>
           <a:bodyPr>
-            <a:normAutofit fontScale="90000"/>
+            <a:normAutofit/>
           </a:bodyPr>
           <a:lstStyle/>
           <a:p>
@@ -3818,7 +6205,15 @@
                   <a:schemeClr val="accent1"/>
                 </a:solidFill>
               </a:rPr>
-              <a:t>Ancestral Reconstruction of Bat Echolocation Calls – What’s the point?</a:t>
+              <a:t>Bats:</a:t>
+            </a:r>
+            <a:r>
+              <a:rPr lang="en-GB" sz="4000" dirty="0" smtClean="0">
+                <a:solidFill>
+                  <a:schemeClr val="accent1"/>
+                </a:solidFill>
+              </a:rPr>
+              <a:t> Engaging the Public</a:t>
             </a:r>
             <a:endParaRPr lang="en-GB" sz="4000" dirty="0">
               <a:solidFill>
@@ -3867,10 +6262,40 @@
           </a:p>
         </p:txBody>
       </p:sp>
+      <p:pic>
+        <p:nvPicPr>
+          <p:cNvPr id="3" name="Picture 2"/>
+          <p:cNvPicPr>
+            <a:picLocks noChangeAspect="1"/>
+          </p:cNvPicPr>
+          <p:nvPr/>
+        </p:nvPicPr>
+        <p:blipFill>
+          <a:blip r:embed="rId2">
+            <a:extLst>
+              <a:ext uri="{28A0092B-C50C-407E-A947-70E740481C1C}">
+                <a14:useLocalDpi xmlns:a14="http://schemas.microsoft.com/office/drawing/2010/main" val="0"/>
+              </a:ext>
+            </a:extLst>
+          </a:blip>
+          <a:stretch>
+            <a:fillRect/>
+          </a:stretch>
+        </p:blipFill>
+        <p:spPr>
+          <a:xfrm>
+            <a:off x="3232514" y="1265060"/>
+            <a:ext cx="5726972" cy="5001672"/>
+          </a:xfrm>
+          <a:prstGeom prst="rect">
+            <a:avLst/>
+          </a:prstGeom>
+        </p:spPr>
+      </p:pic>
     </p:spTree>
     <p:extLst>
       <p:ext uri="{BB962C8B-B14F-4D97-AF65-F5344CB8AC3E}">
-        <p14:creationId xmlns:p14="http://schemas.microsoft.com/office/powerpoint/2010/main" val="2173480721"/>
+        <p14:creationId xmlns:p14="http://schemas.microsoft.com/office/powerpoint/2010/main" val="2633666931"/>
       </p:ext>
     </p:extLst>
   </p:cSld>
@@ -3922,7 +6347,7 @@
         </p:spPr>
         <p:txBody>
           <a:bodyPr>
-            <a:normAutofit fontScale="90000"/>
+            <a:normAutofit/>
           </a:bodyPr>
           <a:lstStyle/>
           <a:p>
@@ -3932,7 +6357,7 @@
                   <a:schemeClr val="accent1"/>
                 </a:solidFill>
               </a:rPr>
-              <a:t>Ancestral Reconstruction of Bat Echolocation Calls – What’s the point?</a:t>
+              <a:t>Bats: Non-invasive Monitoring</a:t>
             </a:r>
             <a:endParaRPr lang="en-GB" sz="4000" dirty="0">
               <a:solidFill>
@@ -3983,14 +6408,14 @@
       </p:sp>
       <p:pic>
         <p:nvPicPr>
-          <p:cNvPr id="6" name="Picture 5"/>
+          <p:cNvPr id="4" name="Picture 3"/>
           <p:cNvPicPr>
             <a:picLocks noChangeAspect="1"/>
           </p:cNvPicPr>
           <p:nvPr/>
         </p:nvPicPr>
         <p:blipFill>
-          <a:blip r:embed="rId2">
+          <a:blip r:embed="rId2" cstate="print">
             <a:extLst>
               <a:ext uri="{28A0092B-C50C-407E-A947-70E740481C1C}">
                 <a14:useLocalDpi xmlns:a14="http://schemas.microsoft.com/office/drawing/2010/main" val="0"/>
@@ -4003,8 +6428,8 @@
         </p:blipFill>
         <p:spPr>
           <a:xfrm>
-            <a:off x="2699192" y="1591383"/>
-            <a:ext cx="6793616" cy="3675235"/>
+            <a:off x="2342388" y="1488948"/>
+            <a:ext cx="7507224" cy="3880104"/>
           </a:xfrm>
           <a:prstGeom prst="rect">
             <a:avLst/>
@@ -4014,7 +6439,7 @@
     </p:spTree>
     <p:extLst>
       <p:ext uri="{BB962C8B-B14F-4D97-AF65-F5344CB8AC3E}">
-        <p14:creationId xmlns:p14="http://schemas.microsoft.com/office/powerpoint/2010/main" val="1794890671"/>
+        <p14:creationId xmlns:p14="http://schemas.microsoft.com/office/powerpoint/2010/main" val="1830614951"/>
       </p:ext>
     </p:extLst>
   </p:cSld>
@@ -4066,7 +6491,7 @@
         </p:spPr>
         <p:txBody>
           <a:bodyPr>
-            <a:normAutofit fontScale="90000"/>
+            <a:normAutofit/>
           </a:bodyPr>
           <a:lstStyle/>
           <a:p>
@@ -4076,7 +6501,7 @@
                   <a:schemeClr val="accent1"/>
                 </a:solidFill>
               </a:rPr>
-              <a:t>Ancestral Reconstruction of Bat Echolocation Calls – What’s the point?</a:t>
+              <a:t>Research Project Summary</a:t>
             </a:r>
             <a:endParaRPr lang="en-GB" sz="4000" dirty="0">
               <a:solidFill>
@@ -4127,28 +6552,22 @@
       </p:sp>
       <p:pic>
         <p:nvPicPr>
-          <p:cNvPr id="4" name="Picture 3"/>
+          <p:cNvPr id="3" name="Picture 2"/>
           <p:cNvPicPr>
             <a:picLocks noChangeAspect="1"/>
           </p:cNvPicPr>
           <p:nvPr/>
         </p:nvPicPr>
         <p:blipFill>
-          <a:blip r:embed="rId2" cstate="print">
-            <a:extLst>
-              <a:ext uri="{28A0092B-C50C-407E-A947-70E740481C1C}">
-                <a14:useLocalDpi xmlns:a14="http://schemas.microsoft.com/office/drawing/2010/main" val="0"/>
-              </a:ext>
-            </a:extLst>
-          </a:blip>
+          <a:blip r:embed="rId2"/>
           <a:stretch>
             <a:fillRect/>
           </a:stretch>
         </p:blipFill>
         <p:spPr>
           <a:xfrm>
-            <a:off x="2342388" y="1488948"/>
-            <a:ext cx="7507224" cy="3880104"/>
+            <a:off x="1935036" y="1133474"/>
+            <a:ext cx="9418764" cy="5334001"/>
           </a:xfrm>
           <a:prstGeom prst="rect">
             <a:avLst/>
@@ -4158,7 +6577,7 @@
     </p:spTree>
     <p:extLst>
       <p:ext uri="{BB962C8B-B14F-4D97-AF65-F5344CB8AC3E}">
-        <p14:creationId xmlns:p14="http://schemas.microsoft.com/office/powerpoint/2010/main" val="1830614951"/>
+        <p14:creationId xmlns:p14="http://schemas.microsoft.com/office/powerpoint/2010/main" val="1565229084"/>
       </p:ext>
     </p:extLst>
   </p:cSld>
@@ -4173,6 +6592,751 @@
     </p:tnLst>
   </p:timing>
 </p:sld>
+</file>
+
+<file path=ppt/slides/slide7.xml><?xml version="1.0" encoding="utf-8"?>
+<p:sld xmlns:a="http://schemas.openxmlformats.org/drawingml/2006/main" xmlns:r="http://schemas.openxmlformats.org/officeDocument/2006/relationships" xmlns:p="http://schemas.openxmlformats.org/presentationml/2006/main">
+  <p:cSld>
+    <p:spTree>
+      <p:nvGrpSpPr>
+        <p:cNvPr id="1" name=""/>
+        <p:cNvGrpSpPr/>
+        <p:nvPr/>
+      </p:nvGrpSpPr>
+      <p:grpSpPr>
+        <a:xfrm>
+          <a:off x="0" y="0"/>
+          <a:ext cx="0" cy="0"/>
+          <a:chOff x="0" y="0"/>
+          <a:chExt cx="0" cy="0"/>
+        </a:xfrm>
+      </p:grpSpPr>
+      <p:sp>
+        <p:nvSpPr>
+          <p:cNvPr id="2" name="Title 1"/>
+          <p:cNvSpPr>
+            <a:spLocks noGrp="1"/>
+          </p:cNvSpPr>
+          <p:nvPr>
+            <p:ph type="title"/>
+          </p:nvPr>
+        </p:nvSpPr>
+        <p:spPr>
+          <a:xfrm>
+            <a:off x="838200" y="365125"/>
+            <a:ext cx="10515600" cy="768349"/>
+          </a:xfrm>
+        </p:spPr>
+        <p:txBody>
+          <a:bodyPr>
+            <a:normAutofit/>
+          </a:bodyPr>
+          <a:lstStyle/>
+          <a:p>
+            <a:r>
+              <a:rPr lang="en-GB" sz="4000" dirty="0" smtClean="0">
+                <a:solidFill>
+                  <a:schemeClr val="accent1"/>
+                </a:solidFill>
+              </a:rPr>
+              <a:t>Ancestral Reconstruction: A Definition</a:t>
+            </a:r>
+            <a:endParaRPr lang="en-GB" sz="4000" dirty="0">
+              <a:solidFill>
+                <a:schemeClr val="accent1"/>
+              </a:solidFill>
+            </a:endParaRPr>
+          </a:p>
+        </p:txBody>
+      </p:sp>
+      <p:sp>
+        <p:nvSpPr>
+          <p:cNvPr id="18" name="AutoShape 2" descr="Image result for epsrc"/>
+          <p:cNvSpPr>
+            <a:spLocks noChangeAspect="1" noChangeArrowheads="1"/>
+          </p:cNvSpPr>
+          <p:nvPr/>
+        </p:nvSpPr>
+        <p:spPr bwMode="auto">
+          <a:xfrm>
+            <a:off x="155575" y="-144463"/>
+            <a:ext cx="304800" cy="304801"/>
+          </a:xfrm>
+          <a:prstGeom prst="rect">
+            <a:avLst/>
+          </a:prstGeom>
+          <a:noFill/>
+          <a:extLst>
+            <a:ext uri="{909E8E84-426E-40DD-AFC4-6F175D3DCCD1}">
+              <a14:hiddenFill xmlns:a14="http://schemas.microsoft.com/office/drawing/2010/main">
+                <a:solidFill>
+                  <a:srgbClr val="FFFFFF"/>
+                </a:solidFill>
+              </a14:hiddenFill>
+            </a:ext>
+          </a:extLst>
+        </p:spPr>
+        <p:txBody>
+          <a:bodyPr vert="horz" wrap="square" lIns="91440" tIns="45720" rIns="91440" bIns="45720" numCol="1" anchor="t" anchorCtr="0" compatLnSpc="1">
+            <a:prstTxWarp prst="textNoShape">
+              <a:avLst/>
+            </a:prstTxWarp>
+          </a:bodyPr>
+          <a:lstStyle/>
+          <a:p>
+            <a:endParaRPr lang="en-GB"/>
+          </a:p>
+        </p:txBody>
+      </p:sp>
+      <p:sp>
+        <p:nvSpPr>
+          <p:cNvPr id="3" name="TextBox 2"/>
+          <p:cNvSpPr txBox="1"/>
+          <p:nvPr/>
+        </p:nvSpPr>
+        <p:spPr>
+          <a:xfrm>
+            <a:off x="460375" y="2508737"/>
+            <a:ext cx="10893425" cy="1077218"/>
+          </a:xfrm>
+          <a:prstGeom prst="rect">
+            <a:avLst/>
+          </a:prstGeom>
+          <a:noFill/>
+        </p:spPr>
+        <p:txBody>
+          <a:bodyPr wrap="square" rtlCol="0">
+            <a:spAutoFit/>
+          </a:bodyPr>
+          <a:lstStyle/>
+          <a:p>
+            <a:r>
+              <a:rPr lang="en-GB" sz="3200" dirty="0">
+                <a:latin typeface="Times New Roman" panose="02020603050405020304" pitchFamily="18" charset="0"/>
+                <a:cs typeface="Times New Roman" panose="02020603050405020304" pitchFamily="18" charset="0"/>
+              </a:rPr>
+              <a:t>T</a:t>
+            </a:r>
+            <a:r>
+              <a:rPr lang="en-GB" sz="3200" dirty="0" smtClean="0">
+                <a:latin typeface="Times New Roman" panose="02020603050405020304" pitchFamily="18" charset="0"/>
+                <a:cs typeface="Times New Roman" panose="02020603050405020304" pitchFamily="18" charset="0"/>
+              </a:rPr>
+              <a:t>he extrapolation back in time from measured characteristics of individuals (or populations) to their common ancestors.</a:t>
+            </a:r>
+            <a:endParaRPr lang="en-GB" sz="3200" dirty="0">
+              <a:latin typeface="Times New Roman" panose="02020603050405020304" pitchFamily="18" charset="0"/>
+              <a:cs typeface="Times New Roman" panose="02020603050405020304" pitchFamily="18" charset="0"/>
+            </a:endParaRPr>
+          </a:p>
+        </p:txBody>
+      </p:sp>
+    </p:spTree>
+    <p:extLst>
+      <p:ext uri="{BB962C8B-B14F-4D97-AF65-F5344CB8AC3E}">
+        <p14:creationId xmlns:p14="http://schemas.microsoft.com/office/powerpoint/2010/main" val="677791873"/>
+      </p:ext>
+    </p:extLst>
+  </p:cSld>
+  <p:clrMapOvr>
+    <a:masterClrMapping/>
+  </p:clrMapOvr>
+  <p:timing>
+    <p:tnLst>
+      <p:par>
+        <p:cTn id="1" dur="indefinite" restart="never" nodeType="tmRoot"/>
+      </p:par>
+    </p:tnLst>
+  </p:timing>
+</p:sld>
+</file>
+
+<file path=ppt/slides/slide8.xml><?xml version="1.0" encoding="utf-8"?>
+<p:sld xmlns:a="http://schemas.openxmlformats.org/drawingml/2006/main" xmlns:r="http://schemas.openxmlformats.org/officeDocument/2006/relationships" xmlns:p="http://schemas.openxmlformats.org/presentationml/2006/main">
+  <p:cSld>
+    <p:spTree>
+      <p:nvGrpSpPr>
+        <p:cNvPr id="1" name=""/>
+        <p:cNvGrpSpPr/>
+        <p:nvPr/>
+      </p:nvGrpSpPr>
+      <p:grpSpPr>
+        <a:xfrm>
+          <a:off x="0" y="0"/>
+          <a:ext cx="0" cy="0"/>
+          <a:chOff x="0" y="0"/>
+          <a:chExt cx="0" cy="0"/>
+        </a:xfrm>
+      </p:grpSpPr>
+      <p:sp>
+        <p:nvSpPr>
+          <p:cNvPr id="2" name="Title 1"/>
+          <p:cNvSpPr>
+            <a:spLocks noGrp="1"/>
+          </p:cNvSpPr>
+          <p:nvPr>
+            <p:ph type="title"/>
+          </p:nvPr>
+        </p:nvSpPr>
+        <p:spPr>
+          <a:xfrm>
+            <a:off x="838200" y="365125"/>
+            <a:ext cx="10515600" cy="768349"/>
+          </a:xfrm>
+        </p:spPr>
+        <p:txBody>
+          <a:bodyPr>
+            <a:normAutofit/>
+          </a:bodyPr>
+          <a:lstStyle/>
+          <a:p>
+            <a:r>
+              <a:rPr lang="en-GB" sz="4000" dirty="0" smtClean="0">
+                <a:solidFill>
+                  <a:schemeClr val="accent1"/>
+                </a:solidFill>
+              </a:rPr>
+              <a:t>Continuous Character Trait Evolution</a:t>
+            </a:r>
+            <a:endParaRPr lang="en-GB" sz="4000" dirty="0">
+              <a:solidFill>
+                <a:schemeClr val="accent1"/>
+              </a:solidFill>
+            </a:endParaRPr>
+          </a:p>
+        </p:txBody>
+      </p:sp>
+      <p:sp>
+        <p:nvSpPr>
+          <p:cNvPr id="18" name="AutoShape 2" descr="Image result for epsrc"/>
+          <p:cNvSpPr>
+            <a:spLocks noChangeAspect="1" noChangeArrowheads="1"/>
+          </p:cNvSpPr>
+          <p:nvPr/>
+        </p:nvSpPr>
+        <p:spPr bwMode="auto">
+          <a:xfrm>
+            <a:off x="155575" y="-144463"/>
+            <a:ext cx="304800" cy="304801"/>
+          </a:xfrm>
+          <a:prstGeom prst="rect">
+            <a:avLst/>
+          </a:prstGeom>
+          <a:noFill/>
+          <a:extLst>
+            <a:ext uri="{909E8E84-426E-40DD-AFC4-6F175D3DCCD1}">
+              <a14:hiddenFill xmlns:a14="http://schemas.microsoft.com/office/drawing/2010/main">
+                <a:solidFill>
+                  <a:srgbClr val="FFFFFF"/>
+                </a:solidFill>
+              </a14:hiddenFill>
+            </a:ext>
+          </a:extLst>
+        </p:spPr>
+        <p:txBody>
+          <a:bodyPr vert="horz" wrap="square" lIns="91440" tIns="45720" rIns="91440" bIns="45720" numCol="1" anchor="t" anchorCtr="0" compatLnSpc="1">
+            <a:prstTxWarp prst="textNoShape">
+              <a:avLst/>
+            </a:prstTxWarp>
+          </a:bodyPr>
+          <a:lstStyle/>
+          <a:p>
+            <a:endParaRPr lang="en-GB"/>
+          </a:p>
+        </p:txBody>
+      </p:sp>
+      <p:graphicFrame>
+        <p:nvGraphicFramePr>
+          <p:cNvPr id="3" name="Object 2"/>
+          <p:cNvGraphicFramePr>
+            <a:graphicFrameLocks noChangeAspect="1"/>
+          </p:cNvGraphicFramePr>
+          <p:nvPr>
+            <p:extLst>
+              <p:ext uri="{D42A27DB-BD31-4B8C-83A1-F6EECF244321}">
+                <p14:modId xmlns:p14="http://schemas.microsoft.com/office/powerpoint/2010/main" val="2371721034"/>
+              </p:ext>
+            </p:extLst>
+          </p:nvPr>
+        </p:nvGraphicFramePr>
+        <p:xfrm>
+          <a:off x="6033477" y="1592384"/>
+          <a:ext cx="5320323" cy="3800231"/>
+        </p:xfrm>
+        <a:graphic>
+          <a:graphicData uri="http://schemas.openxmlformats.org/presentationml/2006/ole">
+            <mc:AlternateContent xmlns:mc="http://schemas.openxmlformats.org/markup-compatibility/2006">
+              <mc:Choice xmlns:v="urn:schemas-microsoft-com:vml" Requires="v">
+                <p:oleObj spid="_x0000_s1042" name="Acrobat Document" r:id="rId3" imgW="4800532" imgH="3429000" progId="AcroExch.Document.DC">
+                  <p:embed/>
+                </p:oleObj>
+              </mc:Choice>
+              <mc:Fallback>
+                <p:oleObj name="Acrobat Document" r:id="rId3" imgW="4800532" imgH="3429000" progId="AcroExch.Document.DC">
+                  <p:embed/>
+                  <p:pic>
+                    <p:nvPicPr>
+                      <p:cNvPr id="0" name=""/>
+                      <p:cNvPicPr/>
+                      <p:nvPr/>
+                    </p:nvPicPr>
+                    <p:blipFill>
+                      <a:blip r:embed="rId4"/>
+                      <a:stretch>
+                        <a:fillRect/>
+                      </a:stretch>
+                    </p:blipFill>
+                    <p:spPr>
+                      <a:xfrm>
+                        <a:off x="6033477" y="1592384"/>
+                        <a:ext cx="5320323" cy="3800231"/>
+                      </a:xfrm>
+                      <a:prstGeom prst="rect">
+                        <a:avLst/>
+                      </a:prstGeom>
+                    </p:spPr>
+                  </p:pic>
+                </p:oleObj>
+              </mc:Fallback>
+            </mc:AlternateContent>
+          </a:graphicData>
+        </a:graphic>
+      </p:graphicFrame>
+      <p:graphicFrame>
+        <p:nvGraphicFramePr>
+          <p:cNvPr id="6" name="Object 5"/>
+          <p:cNvGraphicFramePr>
+            <a:graphicFrameLocks noChangeAspect="1"/>
+          </p:cNvGraphicFramePr>
+          <p:nvPr>
+            <p:extLst>
+              <p:ext uri="{D42A27DB-BD31-4B8C-83A1-F6EECF244321}">
+                <p14:modId xmlns:p14="http://schemas.microsoft.com/office/powerpoint/2010/main" val="2723712974"/>
+              </p:ext>
+            </p:extLst>
+          </p:nvPr>
+        </p:nvGraphicFramePr>
+        <p:xfrm>
+          <a:off x="838200" y="1592384"/>
+          <a:ext cx="5320322" cy="3800230"/>
+        </p:xfrm>
+        <a:graphic>
+          <a:graphicData uri="http://schemas.openxmlformats.org/presentationml/2006/ole">
+            <mc:AlternateContent xmlns:mc="http://schemas.openxmlformats.org/markup-compatibility/2006">
+              <mc:Choice xmlns:v="urn:schemas-microsoft-com:vml" Requires="v">
+                <p:oleObj spid="_x0000_s1043" name="Acrobat Document" r:id="rId5" imgW="4800532" imgH="3429000" progId="AcroExch.Document.DC">
+                  <p:embed/>
+                </p:oleObj>
+              </mc:Choice>
+              <mc:Fallback>
+                <p:oleObj name="Acrobat Document" r:id="rId5" imgW="4800532" imgH="3429000" progId="AcroExch.Document.DC">
+                  <p:embed/>
+                  <p:pic>
+                    <p:nvPicPr>
+                      <p:cNvPr id="0" name=""/>
+                      <p:cNvPicPr/>
+                      <p:nvPr/>
+                    </p:nvPicPr>
+                    <p:blipFill>
+                      <a:blip r:embed="rId6"/>
+                      <a:stretch>
+                        <a:fillRect/>
+                      </a:stretch>
+                    </p:blipFill>
+                    <p:spPr>
+                      <a:xfrm>
+                        <a:off x="838200" y="1592384"/>
+                        <a:ext cx="5320322" cy="3800230"/>
+                      </a:xfrm>
+                      <a:prstGeom prst="rect">
+                        <a:avLst/>
+                      </a:prstGeom>
+                    </p:spPr>
+                  </p:pic>
+                </p:oleObj>
+              </mc:Fallback>
+            </mc:AlternateContent>
+          </a:graphicData>
+        </a:graphic>
+      </p:graphicFrame>
+      <p:sp>
+        <p:nvSpPr>
+          <p:cNvPr id="7" name="TextBox 6"/>
+          <p:cNvSpPr txBox="1"/>
+          <p:nvPr/>
+        </p:nvSpPr>
+        <p:spPr>
+          <a:xfrm>
+            <a:off x="838200" y="1592383"/>
+            <a:ext cx="10515600" cy="461665"/>
+          </a:xfrm>
+          <a:prstGeom prst="rect">
+            <a:avLst/>
+          </a:prstGeom>
+          <a:noFill/>
+        </p:spPr>
+        <p:txBody>
+          <a:bodyPr wrap="square" rtlCol="0">
+            <a:spAutoFit/>
+          </a:bodyPr>
+          <a:lstStyle/>
+          <a:p>
+            <a:pPr algn="ctr"/>
+            <a:r>
+              <a:rPr lang="en-GB" sz="2400" dirty="0" smtClean="0">
+                <a:latin typeface="Times New Roman" panose="02020603050405020304" pitchFamily="18" charset="0"/>
+                <a:cs typeface="Times New Roman" panose="02020603050405020304" pitchFamily="18" charset="0"/>
+              </a:rPr>
+              <a:t>Phylogenetic Ornstein-</a:t>
+            </a:r>
+            <a:r>
+              <a:rPr lang="en-GB" sz="2400" dirty="0" err="1" smtClean="0">
+                <a:latin typeface="Times New Roman" panose="02020603050405020304" pitchFamily="18" charset="0"/>
+                <a:cs typeface="Times New Roman" panose="02020603050405020304" pitchFamily="18" charset="0"/>
+              </a:rPr>
+              <a:t>Uhlenbeck</a:t>
+            </a:r>
+            <a:r>
+              <a:rPr lang="en-GB" sz="2400" dirty="0" smtClean="0">
+                <a:latin typeface="Times New Roman" panose="02020603050405020304" pitchFamily="18" charset="0"/>
+                <a:cs typeface="Times New Roman" panose="02020603050405020304" pitchFamily="18" charset="0"/>
+              </a:rPr>
+              <a:t> Process</a:t>
+            </a:r>
+            <a:endParaRPr lang="en-GB" sz="2400" dirty="0">
+              <a:latin typeface="Times New Roman" panose="02020603050405020304" pitchFamily="18" charset="0"/>
+              <a:cs typeface="Times New Roman" panose="02020603050405020304" pitchFamily="18" charset="0"/>
+            </a:endParaRPr>
+          </a:p>
+        </p:txBody>
+      </p:sp>
+    </p:spTree>
+    <p:extLst>
+      <p:ext uri="{BB962C8B-B14F-4D97-AF65-F5344CB8AC3E}">
+        <p14:creationId xmlns:p14="http://schemas.microsoft.com/office/powerpoint/2010/main" val="2437133949"/>
+      </p:ext>
+    </p:extLst>
+  </p:cSld>
+  <p:clrMapOvr>
+    <a:masterClrMapping/>
+  </p:clrMapOvr>
+  <p:timing>
+    <p:tnLst>
+      <p:par>
+        <p:cTn id="1" dur="indefinite" restart="never" nodeType="tmRoot"/>
+      </p:par>
+    </p:tnLst>
+  </p:timing>
+</p:sld>
+</file>
+
+<file path=ppt/slides/slide9.xml><?xml version="1.0" encoding="utf-8"?>
+<p:sld xmlns:a="http://schemas.openxmlformats.org/drawingml/2006/main" xmlns:r="http://schemas.openxmlformats.org/officeDocument/2006/relationships" xmlns:p="http://schemas.openxmlformats.org/presentationml/2006/main">
+  <p:cSld>
+    <p:spTree>
+      <p:nvGrpSpPr>
+        <p:cNvPr id="1" name=""/>
+        <p:cNvGrpSpPr/>
+        <p:nvPr/>
+      </p:nvGrpSpPr>
+      <p:grpSpPr>
+        <a:xfrm>
+          <a:off x="0" y="0"/>
+          <a:ext cx="0" cy="0"/>
+          <a:chOff x="0" y="0"/>
+          <a:chExt cx="0" cy="0"/>
+        </a:xfrm>
+      </p:grpSpPr>
+      <p:sp>
+        <p:nvSpPr>
+          <p:cNvPr id="2" name="Title 1"/>
+          <p:cNvSpPr>
+            <a:spLocks noGrp="1"/>
+          </p:cNvSpPr>
+          <p:nvPr>
+            <p:ph type="title"/>
+          </p:nvPr>
+        </p:nvSpPr>
+        <p:spPr>
+          <a:xfrm>
+            <a:off x="838200" y="365125"/>
+            <a:ext cx="10515600" cy="768349"/>
+          </a:xfrm>
+        </p:spPr>
+        <p:txBody>
+          <a:bodyPr>
+            <a:normAutofit/>
+          </a:bodyPr>
+          <a:lstStyle/>
+          <a:p>
+            <a:r>
+              <a:rPr lang="en-GB" sz="4000" dirty="0" smtClean="0">
+                <a:solidFill>
+                  <a:schemeClr val="accent1"/>
+                </a:solidFill>
+              </a:rPr>
+              <a:t>Function-Valued Traits: A Definition</a:t>
+            </a:r>
+            <a:endParaRPr lang="en-GB" sz="4000" dirty="0">
+              <a:solidFill>
+                <a:schemeClr val="accent1"/>
+              </a:solidFill>
+            </a:endParaRPr>
+          </a:p>
+        </p:txBody>
+      </p:sp>
+      <p:sp>
+        <p:nvSpPr>
+          <p:cNvPr id="18" name="AutoShape 2" descr="Image result for epsrc"/>
+          <p:cNvSpPr>
+            <a:spLocks noChangeAspect="1" noChangeArrowheads="1"/>
+          </p:cNvSpPr>
+          <p:nvPr/>
+        </p:nvSpPr>
+        <p:spPr bwMode="auto">
+          <a:xfrm>
+            <a:off x="155575" y="-144463"/>
+            <a:ext cx="304800" cy="304801"/>
+          </a:xfrm>
+          <a:prstGeom prst="rect">
+            <a:avLst/>
+          </a:prstGeom>
+          <a:noFill/>
+          <a:extLst>
+            <a:ext uri="{909E8E84-426E-40DD-AFC4-6F175D3DCCD1}">
+              <a14:hiddenFill xmlns:a14="http://schemas.microsoft.com/office/drawing/2010/main">
+                <a:solidFill>
+                  <a:srgbClr val="FFFFFF"/>
+                </a:solidFill>
+              </a14:hiddenFill>
+            </a:ext>
+          </a:extLst>
+        </p:spPr>
+        <p:txBody>
+          <a:bodyPr vert="horz" wrap="square" lIns="91440" tIns="45720" rIns="91440" bIns="45720" numCol="1" anchor="t" anchorCtr="0" compatLnSpc="1">
+            <a:prstTxWarp prst="textNoShape">
+              <a:avLst/>
+            </a:prstTxWarp>
+          </a:bodyPr>
+          <a:lstStyle/>
+          <a:p>
+            <a:endParaRPr lang="en-GB"/>
+          </a:p>
+        </p:txBody>
+      </p:sp>
+      <p:sp>
+        <p:nvSpPr>
+          <p:cNvPr id="3" name="TextBox 2"/>
+          <p:cNvSpPr txBox="1"/>
+          <p:nvPr/>
+        </p:nvSpPr>
+        <p:spPr>
+          <a:xfrm>
+            <a:off x="460375" y="2250829"/>
+            <a:ext cx="10893425" cy="2062103"/>
+          </a:xfrm>
+          <a:prstGeom prst="rect">
+            <a:avLst/>
+          </a:prstGeom>
+          <a:noFill/>
+        </p:spPr>
+        <p:txBody>
+          <a:bodyPr wrap="square" rtlCol="0">
+            <a:spAutoFit/>
+          </a:bodyPr>
+          <a:lstStyle/>
+          <a:p>
+            <a:r>
+              <a:rPr lang="en-GB" sz="3200" dirty="0" smtClean="0">
+                <a:latin typeface="Times New Roman" panose="02020603050405020304" pitchFamily="18" charset="0"/>
+                <a:cs typeface="Times New Roman" panose="02020603050405020304" pitchFamily="18" charset="0"/>
+              </a:rPr>
+              <a:t>A trait that is repeatedly measured, </a:t>
+            </a:r>
+            <a:r>
+              <a:rPr lang="en-GB" sz="3200" dirty="0">
+                <a:latin typeface="Times New Roman" panose="02020603050405020304" pitchFamily="18" charset="0"/>
+                <a:cs typeface="Times New Roman" panose="02020603050405020304" pitchFamily="18" charset="0"/>
+              </a:rPr>
+              <a:t>along some continuous </a:t>
+            </a:r>
+            <a:r>
+              <a:rPr lang="en-GB" sz="3200" dirty="0" smtClean="0">
+                <a:latin typeface="Times New Roman" panose="02020603050405020304" pitchFamily="18" charset="0"/>
+                <a:cs typeface="Times New Roman" panose="02020603050405020304" pitchFamily="18" charset="0"/>
+              </a:rPr>
+              <a:t>scale, where measurements can represent </a:t>
+            </a:r>
+            <a:r>
+              <a:rPr lang="en-GB" sz="3200" dirty="0">
+                <a:latin typeface="Times New Roman" panose="02020603050405020304" pitchFamily="18" charset="0"/>
+                <a:cs typeface="Times New Roman" panose="02020603050405020304" pitchFamily="18" charset="0"/>
+              </a:rPr>
+              <a:t>points on a curve, </a:t>
+            </a:r>
+            <a:r>
+              <a:rPr lang="en-GB" sz="3200" dirty="0" smtClean="0">
+                <a:latin typeface="Times New Roman" panose="02020603050405020304" pitchFamily="18" charset="0"/>
+                <a:cs typeface="Times New Roman" panose="02020603050405020304" pitchFamily="18" charset="0"/>
+              </a:rPr>
+              <a:t>and </a:t>
+            </a:r>
+            <a:r>
+              <a:rPr lang="en-GB" sz="3200" dirty="0">
+                <a:latin typeface="Times New Roman" panose="02020603050405020304" pitchFamily="18" charset="0"/>
+                <a:cs typeface="Times New Roman" panose="02020603050405020304" pitchFamily="18" charset="0"/>
+              </a:rPr>
+              <a:t>both means and </a:t>
+            </a:r>
+            <a:r>
+              <a:rPr lang="en-GB" sz="3200" dirty="0" err="1">
+                <a:latin typeface="Times New Roman" panose="02020603050405020304" pitchFamily="18" charset="0"/>
+                <a:cs typeface="Times New Roman" panose="02020603050405020304" pitchFamily="18" charset="0"/>
+              </a:rPr>
+              <a:t>covariances</a:t>
+            </a:r>
+            <a:r>
+              <a:rPr lang="en-GB" sz="3200" dirty="0">
+                <a:latin typeface="Times New Roman" panose="02020603050405020304" pitchFamily="18" charset="0"/>
+                <a:cs typeface="Times New Roman" panose="02020603050405020304" pitchFamily="18" charset="0"/>
+              </a:rPr>
+              <a:t> along the trajectory can change, gradually and continually.</a:t>
+            </a:r>
+          </a:p>
+        </p:txBody>
+      </p:sp>
+    </p:spTree>
+    <p:extLst>
+      <p:ext uri="{BB962C8B-B14F-4D97-AF65-F5344CB8AC3E}">
+        <p14:creationId xmlns:p14="http://schemas.microsoft.com/office/powerpoint/2010/main" val="2237914222"/>
+      </p:ext>
+    </p:extLst>
+  </p:cSld>
+  <p:clrMapOvr>
+    <a:masterClrMapping/>
+  </p:clrMapOvr>
+  <p:timing>
+    <p:tnLst>
+      <p:par>
+        <p:cTn id="1" dur="indefinite" restart="never" nodeType="tmRoot"/>
+      </p:par>
+    </p:tnLst>
+  </p:timing>
+</p:sld>
+</file>
+
+<file path=ppt/tags/tag1.xml><?xml version="1.0" encoding="utf-8"?>
+<p:tagLst xmlns:a="http://schemas.openxmlformats.org/drawingml/2006/main" xmlns:r="http://schemas.openxmlformats.org/officeDocument/2006/relationships" xmlns:p="http://schemas.openxmlformats.org/presentationml/2006/main">
+  <p:tag name="OUTPUTDPI" val="1200"/>
+  <p:tag name="ORIGINALHEIGHT" val="1226.097"/>
+  <p:tag name="ORIGINALWIDTH" val="1413.573"/>
+  <p:tag name="LATEXADDIN" val="\documentclass{article}&#10;\usepackage{amsmath}&#10;\pagestyle{empty}&#10;\begin{document}&#10;&#10;\[f(\mathbf{x}) \sim \mathcal{GP}(m(\mathbf{x}), k(\mathbf{x}, \mathbf{x}'))\]&#10;&#10;\[m(\mathbf{x}) = \mathbf{E}(f(\mathbf{x})) \]&#10;&#10;\[k(\mathbf{x}, \mathbf{x}') = \text{cov}(\mathbf{x}, \mathbf{x}')\]&#10;&#10;\[\mathbf{x} \in \mathbf{R}^p\]&#10;&#10;\end{document}"/>
+  <p:tag name="IGUANATEXSIZE" val="20"/>
+  <p:tag name="IGUANATEXCURSOR" val="308"/>
+  <p:tag name="TRANSPARENCY" val="True"/>
+  <p:tag name="FILENAME" val=""/>
+  <p:tag name="LATEXENGINEID" val="0"/>
+  <p:tag name="TEMPFOLDER" val="C:\Users\joe\Documents\Iguana\"/>
+  <p:tag name="LATEXFORMHEIGHT" val="312"/>
+  <p:tag name="LATEXFORMWIDTH" val="384"/>
+  <p:tag name="LATEXFORMWRAP" val="True"/>
+  <p:tag name="BITMAPVECTOR" val="0"/>
+</p:tagLst>
+</file>
+
+<file path=ppt/tags/tag2.xml><?xml version="1.0" encoding="utf-8"?>
+<p:tagLst xmlns:a="http://schemas.openxmlformats.org/drawingml/2006/main" xmlns:r="http://schemas.openxmlformats.org/officeDocument/2006/relationships" xmlns:p="http://schemas.openxmlformats.org/presentationml/2006/main">
+  <p:tag name="OUTPUTDPI" val="1200"/>
+  <p:tag name="ORIGINALHEIGHT" val="131.2336"/>
+  <p:tag name="ORIGINALWIDTH" val="1784.027"/>
+  <p:tag name="LATEXADDIN" val="\documentclass{article}&#10;\usepackage{amsmath}&#10;\pagestyle{empty}&#10;\begin{document}&#10;&#10;\[&#10;\Sigma ((f, t), (f', t')) = K(f,f')k(t,t') &#10;\]&#10;&#10;&#10;\end{document}"/>
+  <p:tag name="IGUANATEXSIZE" val="20"/>
+  <p:tag name="IGUANATEXCURSOR" val="126"/>
+  <p:tag name="TRANSPARENCY" val="True"/>
+  <p:tag name="FILENAME" val=""/>
+  <p:tag name="LATEXENGINEID" val="0"/>
+  <p:tag name="TEMPFOLDER" val="C:\Users\joe\Documents\Iguana\"/>
+  <p:tag name="LATEXFORMHEIGHT" val="312"/>
+  <p:tag name="LATEXFORMWIDTH" val="384"/>
+  <p:tag name="LATEXFORMWRAP" val="True"/>
+  <p:tag name="BITMAPVECTOR" val="0"/>
+</p:tagLst>
+</file>
+
+<file path=ppt/tags/tag3.xml><?xml version="1.0" encoding="utf-8"?>
+<p:tagLst xmlns:a="http://schemas.openxmlformats.org/drawingml/2006/main" xmlns:r="http://schemas.openxmlformats.org/officeDocument/2006/relationships" xmlns:p="http://schemas.openxmlformats.org/presentationml/2006/main">
+  <p:tag name="OUTPUTDPI" val="1200"/>
+  <p:tag name="ORIGINALHEIGHT" val="2173.978"/>
+  <p:tag name="ORIGINALWIDTH" val="4299.962"/>
+  <p:tag name="LATEXADDIN" val="\documentclass{article}&#10;\usepackage{amsmath}&#10;\pagestyle{empty}&#10;\begin{document}&#10;&#10;For a phylogenetic Gaussian Process \(Y\) with time-space separable covariance function, when \(K\) is a degenerate Mercer kernel, there exists a set of \(n\) deterministic basis functions \(\phi_i: F \to \mathbf{R}\) and univariate GPs \(X_i\) for \(i = 1,\dots, n\) such that &#10;\[&#10;g(f, \mathbf{t}) = \sum_{i = 1}^{n} \phi_i(f) X_i(\mathbf{t})&#10;\] &#10;has the same distribution as \(Y\). The full phylogenetic covariance function of this phylogenetic GP is&#10;\[&#10;\Sigma_{\mathbf{T}}((f, \mathbf{t}), (f', \mathbf{t}')) = \sum_{i = 1}^{n}  k_{\mathbf{T}}^i(\mathbf{t}, \mathbf{t}') \phi_i(f) \phi_i(f'),&#10;\]&#10;where \(\int \phi_i(f) \phi_j(f) df = \delta_{ij}\), \(\delta\) being the Kronecker delta, and so the phylogenetic covariance function depends only on \(\mathbf{t}, \mathbf{t}' \in \mathbf{T}\).&#10;&#10;&#10;\end{document}"/>
+  <p:tag name="IGUANATEXSIZE" val="20"/>
+  <p:tag name="IGUANATEXCURSOR" val="168"/>
+  <p:tag name="TRANSPARENCY" val="True"/>
+  <p:tag name="FILENAME" val=""/>
+  <p:tag name="LATEXENGINEID" val="0"/>
+  <p:tag name="TEMPFOLDER" val="C:\Users\joe\Documents\Iguana\"/>
+  <p:tag name="LATEXFORMHEIGHT" val="312"/>
+  <p:tag name="LATEXFORMWIDTH" val="384"/>
+  <p:tag name="LATEXFORMWRAP" val="True"/>
+  <p:tag name="BITMAPVECTOR" val="0"/>
+</p:tagLst>
+</file>
+
+<file path=ppt/tags/tag4.xml><?xml version="1.0" encoding="utf-8"?>
+<p:tagLst xmlns:a="http://schemas.openxmlformats.org/drawingml/2006/main" xmlns:r="http://schemas.openxmlformats.org/officeDocument/2006/relationships" xmlns:p="http://schemas.openxmlformats.org/presentationml/2006/main">
+  <p:tag name="OUTPUTDPI" val="1200"/>
+  <p:tag name="ORIGINALHEIGHT" val="299.2126"/>
+  <p:tag name="ORIGINALWIDTH" val="2517.435"/>
+  <p:tag name="LATEXADDIN" val="\documentclass{article}&#10;\usepackage{amsmath}&#10;\pagestyle{empty}&#10;\begin{document}&#10;&#10;\[&#10;k_{\mathbf{T}}^i(\mathbf{t}, \mathbf{t}') = (\sigma_p^i)^2 \exp \left( \frac{-d_{\mathbf{T}}(\mathbf{t}, \mathbf{t}')}{\ell^i} \right) + (\sigma_n^i)^2 \delta_{\mathbf{t}, \mathbf{t}'}&#10;\label{eqn:oukernel}&#10;\]&#10;&#10;\end{document}"/>
+  <p:tag name="IGUANATEXSIZE" val="20"/>
+  <p:tag name="IGUANATEXCURSOR" val="292"/>
+  <p:tag name="TRANSPARENCY" val="True"/>
+  <p:tag name="FILENAME" val=""/>
+  <p:tag name="LATEXENGINEID" val="0"/>
+  <p:tag name="TEMPFOLDER" val="C:\Users\joe\Documents\Iguana\"/>
+  <p:tag name="LATEXFORMHEIGHT" val="312"/>
+  <p:tag name="LATEXFORMWIDTH" val="384"/>
+  <p:tag name="LATEXFORMWRAP" val="True"/>
+  <p:tag name="BITMAPVECTOR" val="0"/>
+</p:tagLst>
+</file>
+
+<file path=ppt/tags/tag5.xml><?xml version="1.0" encoding="utf-8"?>
+<p:tagLst xmlns:a="http://schemas.openxmlformats.org/drawingml/2006/main" xmlns:r="http://schemas.openxmlformats.org/officeDocument/2006/relationships" xmlns:p="http://schemas.openxmlformats.org/presentationml/2006/main">
+  <p:tag name="OUTPUTDPI" val="1200"/>
+  <p:tag name="ORIGINALHEIGHT" val="1046.119"/>
+  <p:tag name="ORIGINALWIDTH" val="2582.677"/>
+  <p:tag name="LATEXADDIN" val="\documentclass{article}&#10;\usepackage{amsmath}&#10;\pagestyle{empty}&#10;\begin{document}&#10;&#10;\begin{table}[]&#10;\centering&#10;\begin{tabular}{cccc}&#10; Basis &amp; \(\hat{\sigma}_p\) &amp; \(\hat{\ell}\) &amp; \(\hat{\sigma}_n\) \\&#10;   1 &amp; 2.30 (0.11) &amp; 12.27 ( 4.18) &amp; 1.18 (0.11) \\&#10;   2 &amp; 3.17 (0.11) &amp; 27.63 ( 3.70) &amp; 1.26 (0.13) \\&#10;   3 &amp; 4.05 (0.32) &amp; 70.50 (20.31) &amp; 1.19 (0.12) \\&#10;   4 &amp; 3.32 (0.17) &amp; 22.86 ( 8.95) &amp; 1.96 (0.19) \\&#10;   5 &amp; 3.00 (0.13) &amp; 26.93 ( 2.85) &amp; 1.21 (0.11) \\&#10;   6 &amp; 3.70 (0.14) &amp; 12.82 ( 4.52) &amp; 1.28 (0.15) \\&#10;\end{tabular}&#10;\end{table}&#10;&#10;&#10;\end{document}"/>
+  <p:tag name="IGUANATEXSIZE" val="20"/>
+  <p:tag name="IGUANATEXCURSOR" val="128"/>
+  <p:tag name="TRANSPARENCY" val="True"/>
+  <p:tag name="FILENAME" val=""/>
+  <p:tag name="LATEXENGINEID" val="0"/>
+  <p:tag name="TEMPFOLDER" val="C:\Users\joe\Documents\Iguana\"/>
+  <p:tag name="LATEXFORMHEIGHT" val="312"/>
+  <p:tag name="LATEXFORMWIDTH" val="384"/>
+  <p:tag name="LATEXFORMWRAP" val="True"/>
+  <p:tag name="BITMAPVECTOR" val="0"/>
+</p:tagLst>
+</file>
+
+<file path=ppt/tags/tag6.xml><?xml version="1.0" encoding="utf-8"?>
+<p:tagLst xmlns:a="http://schemas.openxmlformats.org/drawingml/2006/main" xmlns:r="http://schemas.openxmlformats.org/officeDocument/2006/relationships" xmlns:p="http://schemas.openxmlformats.org/presentationml/2006/main">
+  <p:tag name="OUTPUTDPI" val="1200"/>
+  <p:tag name="ORIGINALHEIGHT" val="1046.119"/>
+  <p:tag name="ORIGINALWIDTH" val="2582.677"/>
+  <p:tag name="LATEXADDIN" val="\documentclass{article}&#10;\usepackage{amsmath}&#10;\usepackage{array}&#10;\pagestyle{empty}&#10;\begin{document}&#10;&#10;\makeatletter&#10;\def\highlight#1{%&#10;\fboxrule2pt %&#10;\hsize=\dimexpr\hsize-2\fboxrule-2\fboxsep\relax&#10;#1%&#10;\@endpbox\unskip\setbox0\lastbox\bgroup&#10;\fboxrule2pt %&#10;\fcolorbox{red}{lightgray}{\box0}\hfill}&#10;&#10;\begin{table}[]&#10;\centering&#10;\begin{tabular}{cccc}&#10; Basis &amp; \(\hat{\sigma}_p\) &amp; \(\hat{\ell}\) &amp; \(\hat{\sigma}_n\) \\&#10;   1 &amp; 2.30 (0.11) &amp; 12.27 ( 4.18) &amp; 1.18 (0.11) \\&#10;   2 &amp; 3.17 (0.11) &amp; 27.63 ( 3.70) &amp; 1.26 (0.13) \\&#10;   3 &amp; 4.05 (0.32) &amp; 70.50 (20.31) &amp; 1.19 (0.12) \\&#10;   4 &amp; 3.32 (0.17) &amp; 22.86 ( 8.95) &amp; 1.96 (0.19) \\&#10;   5 &amp; 3.00 (0.13) &amp; 26.93 ( 2.85) &amp; 1.21 (0.11) \\&#10;   6 &amp; 3.70 (0.14) &amp; 12.82 ( 4.52) &amp; 1.28 (0.15) \\&#10;\end{tabular}&#10;\end{table}&#10;&#10;&#10;\end{document}"/>
+  <p:tag name="IGUANATEXSIZE" val="20"/>
+  <p:tag name="IGUANATEXCURSOR" val="347"/>
+  <p:tag name="TRANSPARENCY" val="True"/>
+  <p:tag name="FILENAME" val=""/>
+  <p:tag name="LATEXENGINEID" val="0"/>
+  <p:tag name="TEMPFOLDER" val="C:\Users\joe\Documents\Iguana\"/>
+  <p:tag name="LATEXFORMHEIGHT" val="312"/>
+  <p:tag name="LATEXFORMWIDTH" val="384"/>
+  <p:tag name="LATEXFORMWRAP" val="True"/>
+  <p:tag name="BITMAPVECTOR" val="0"/>
+</p:tagLst>
 </file>
 
 <file path=ppt/theme/theme1.xml><?xml version="1.0" encoding="utf-8"?>

</xml_diff>